<commit_message>
merge generate_all_datasets and generate_specific_datasets
</commit_message>
<xml_diff>
--- a/resources/wraval_presentation.pptx
+++ b/resources/wraval_presentation.pptx
@@ -8,15 +8,22 @@
     <p:sldId id="256" r:id="rId2"/>
     <p:sldId id="257" r:id="rId3"/>
     <p:sldId id="258" r:id="rId4"/>
-    <p:sldId id="266" r:id="rId5"/>
-    <p:sldId id="259" r:id="rId6"/>
-    <p:sldId id="260" r:id="rId7"/>
-    <p:sldId id="261" r:id="rId8"/>
-    <p:sldId id="262" r:id="rId9"/>
-    <p:sldId id="263" r:id="rId10"/>
-    <p:sldId id="264" r:id="rId11"/>
-    <p:sldId id="267" r:id="rId12"/>
-    <p:sldId id="265" r:id="rId13"/>
+    <p:sldId id="275" r:id="rId5"/>
+    <p:sldId id="276" r:id="rId6"/>
+    <p:sldId id="277" r:id="rId7"/>
+    <p:sldId id="278" r:id="rId8"/>
+    <p:sldId id="274" r:id="rId9"/>
+    <p:sldId id="266" r:id="rId10"/>
+    <p:sldId id="259" r:id="rId11"/>
+    <p:sldId id="268" r:id="rId12"/>
+    <p:sldId id="269" r:id="rId13"/>
+    <p:sldId id="270" r:id="rId14"/>
+    <p:sldId id="271" r:id="rId15"/>
+    <p:sldId id="272" r:id="rId16"/>
+    <p:sldId id="273" r:id="rId17"/>
+    <p:sldId id="263" r:id="rId18"/>
+    <p:sldId id="267" r:id="rId19"/>
+    <p:sldId id="279" r:id="rId20"/>
   </p:sldIdLst>
   <p:sldSz cx="9144000" cy="5143500" type="screen16x9"/>
   <p:notesSz cx="6858000" cy="9144000"/>
@@ -3728,12 +3735,43 @@
               <a:buNone/>
             </a:pPr>
             <a:r>
-              <a:rPr dirty="0"/>
-              <a:t>Applications &amp; Impact</a:t>
-            </a:r>
-          </a:p>
-        </p:txBody>
-      </p:sp>
+              <a:rPr lang="en-US" dirty="0"/>
+              <a:t>The WRAVAL Pipeline</a:t>
+            </a:r>
+            <a:endParaRPr dirty="0"/>
+          </a:p>
+        </p:txBody>
+      </p:sp>
+      <p:pic>
+        <p:nvPicPr>
+          <p:cNvPr id="7" name="Picture 6">
+            <a:extLst>
+              <a:ext uri="{FF2B5EF4-FFF2-40B4-BE49-F238E27FC236}">
+                <a16:creationId xmlns:a16="http://schemas.microsoft.com/office/drawing/2014/main" id="{4838DDF5-8C9D-8CEC-049B-22B5F776F32C}"/>
+              </a:ext>
+            </a:extLst>
+          </p:cNvPr>
+          <p:cNvPicPr>
+            <a:picLocks noChangeAspect="1"/>
+          </p:cNvPicPr>
+          <p:nvPr/>
+        </p:nvPicPr>
+        <p:blipFill>
+          <a:blip r:embed="rId2"/>
+          <a:stretch>
+            <a:fillRect/>
+          </a:stretch>
+        </p:blipFill>
+        <p:spPr>
+          <a:xfrm>
+            <a:off x="3538728" y="1104384"/>
+            <a:ext cx="5536517" cy="3952337"/>
+          </a:xfrm>
+          <a:prstGeom prst="rect">
+            <a:avLst/>
+          </a:prstGeom>
+        </p:spPr>
+      </p:pic>
       <p:sp>
         <p:nvSpPr>
           <p:cNvPr id="3" name="Content Placeholder 2"/>
@@ -3744,37 +3782,78 @@
             <p:ph idx="1"/>
           </p:nvPr>
         </p:nvSpPr>
-        <p:spPr/>
+        <p:spPr>
+          <a:xfrm>
+            <a:off x="381000" y="1042991"/>
+            <a:ext cx="7696200" cy="3252074"/>
+          </a:xfrm>
+        </p:spPr>
         <p:txBody>
           <a:bodyPr/>
           <a:lstStyle/>
           <a:p>
+            <a:pPr lvl="0">
+              <a:buFont typeface="Wingdings" pitchFamily="2" charset="2"/>
+              <a:buChar char="ü"/>
+            </a:pPr>
+            <a:r>
+              <a:rPr lang="en-US" dirty="0"/>
+              <a:t>Synthetic data generation</a:t>
+            </a:r>
+          </a:p>
+          <a:p>
             <a:pPr lvl="0"/>
             <a:r>
-              <a:rPr dirty="0"/>
-              <a:t>Benchmark for AI writing assistants</a:t>
-            </a:r>
+              <a:rPr lang="en-US" dirty="0"/>
+              <a:t>Deploy </a:t>
+            </a:r>
+            <a:r>
+              <a:rPr lang="en-US" dirty="0" err="1"/>
+              <a:t>Sagemaker</a:t>
+            </a:r>
+            <a:r>
+              <a:rPr lang="en-US" dirty="0"/>
+              <a:t> endpoint</a:t>
+            </a:r>
+            <a:endParaRPr dirty="0"/>
           </a:p>
           <a:p>
             <a:pPr lvl="0"/>
             <a:r>
-              <a:rPr dirty="0"/>
-              <a:t>Tool for improving AI models</a:t>
+              <a:rPr lang="en-US" dirty="0"/>
+              <a:t>Inference [Bedrock / </a:t>
+            </a:r>
+            <a:r>
+              <a:rPr lang="en-US" dirty="0" err="1"/>
+              <a:t>Sagemaker</a:t>
+            </a:r>
+            <a:r>
+              <a:rPr lang="en-US" dirty="0"/>
+              <a:t> endpoint]</a:t>
             </a:r>
           </a:p>
           <a:p>
             <a:pPr lvl="0"/>
             <a:r>
-              <a:rPr dirty="0"/>
-              <a:t>Framework for quality assessment</a:t>
+              <a:rPr lang="en-US" dirty="0"/>
+              <a:t>LLM-as-a-judge</a:t>
             </a:r>
           </a:p>
           <a:p>
             <a:pPr lvl="0"/>
             <a:r>
-              <a:rPr dirty="0"/>
-              <a:t>Industry standard potential</a:t>
-            </a:r>
+              <a:rPr lang="en-US" dirty="0"/>
+              <a:t>Human-as-a-judge [</a:t>
+            </a:r>
+            <a:r>
+              <a:rPr lang="en-US" dirty="0" err="1"/>
+              <a:t>Mturk</a:t>
+            </a:r>
+            <a:r>
+              <a:rPr lang="en-US" dirty="0"/>
+              <a:t> / colleagues]</a:t>
+            </a:r>
+            <a:endParaRPr dirty="0"/>
           </a:p>
         </p:txBody>
       </p:sp>
@@ -3787,6 +3866,1271 @@
 </file>
 
 <file path=ppt/slides/slide11.xml><?xml version="1.0" encoding="utf-8"?>
+<p:sld xmlns:a="http://schemas.openxmlformats.org/drawingml/2006/main" xmlns:r="http://schemas.openxmlformats.org/officeDocument/2006/relationships" xmlns:p="http://schemas.openxmlformats.org/presentationml/2006/main">
+  <p:cSld>
+    <p:spTree>
+      <p:nvGrpSpPr>
+        <p:cNvPr id="1" name="">
+          <a:extLst>
+            <a:ext uri="{FF2B5EF4-FFF2-40B4-BE49-F238E27FC236}">
+              <a16:creationId xmlns:a16="http://schemas.microsoft.com/office/drawing/2014/main" id="{225C2B91-30FE-4378-8DAB-D9A6598CA09C}"/>
+            </a:ext>
+          </a:extLst>
+        </p:cNvPr>
+        <p:cNvGrpSpPr/>
+        <p:nvPr/>
+      </p:nvGrpSpPr>
+      <p:grpSpPr>
+        <a:xfrm>
+          <a:off x="0" y="0"/>
+          <a:ext cx="0" cy="0"/>
+          <a:chOff x="0" y="0"/>
+          <a:chExt cx="0" cy="0"/>
+        </a:xfrm>
+      </p:grpSpPr>
+      <p:sp>
+        <p:nvSpPr>
+          <p:cNvPr id="2" name="Title 1">
+            <a:extLst>
+              <a:ext uri="{FF2B5EF4-FFF2-40B4-BE49-F238E27FC236}">
+                <a16:creationId xmlns:a16="http://schemas.microsoft.com/office/drawing/2014/main" id="{BB120DE6-0361-5D53-924C-145F90A8D5D9}"/>
+              </a:ext>
+            </a:extLst>
+          </p:cNvPr>
+          <p:cNvSpPr>
+            <a:spLocks noGrp="1"/>
+          </p:cNvSpPr>
+          <p:nvPr>
+            <p:ph type="title"/>
+          </p:nvPr>
+        </p:nvSpPr>
+        <p:spPr/>
+        <p:txBody>
+          <a:bodyPr/>
+          <a:lstStyle/>
+          <a:p>
+            <a:pPr marL="0" lvl="0" indent="0">
+              <a:buNone/>
+            </a:pPr>
+            <a:r>
+              <a:rPr lang="en-US" dirty="0"/>
+              <a:t>The WRAVAL Pipeline</a:t>
+            </a:r>
+            <a:endParaRPr dirty="0"/>
+          </a:p>
+        </p:txBody>
+      </p:sp>
+      <p:sp>
+        <p:nvSpPr>
+          <p:cNvPr id="3" name="Content Placeholder 2">
+            <a:extLst>
+              <a:ext uri="{FF2B5EF4-FFF2-40B4-BE49-F238E27FC236}">
+                <a16:creationId xmlns:a16="http://schemas.microsoft.com/office/drawing/2014/main" id="{466AECC1-9DBE-7F1C-6F35-F592B26082F7}"/>
+              </a:ext>
+            </a:extLst>
+          </p:cNvPr>
+          <p:cNvSpPr>
+            <a:spLocks noGrp="1"/>
+          </p:cNvSpPr>
+          <p:nvPr>
+            <p:ph idx="1"/>
+          </p:nvPr>
+        </p:nvSpPr>
+        <p:spPr>
+          <a:xfrm>
+            <a:off x="381000" y="1042991"/>
+            <a:ext cx="7696200" cy="3252074"/>
+          </a:xfrm>
+        </p:spPr>
+        <p:txBody>
+          <a:bodyPr/>
+          <a:lstStyle/>
+          <a:p>
+            <a:pPr lvl="0">
+              <a:buFont typeface="Wingdings" pitchFamily="2" charset="2"/>
+              <a:buChar char="ü"/>
+            </a:pPr>
+            <a:r>
+              <a:rPr lang="en-US" dirty="0"/>
+              <a:t>Synthetic data generation</a:t>
+            </a:r>
+          </a:p>
+          <a:p>
+            <a:pPr lvl="0">
+              <a:buFont typeface="Wingdings" pitchFamily="2" charset="2"/>
+              <a:buChar char="ü"/>
+            </a:pPr>
+            <a:r>
+              <a:rPr lang="en-US" dirty="0"/>
+              <a:t>Deploy </a:t>
+            </a:r>
+            <a:r>
+              <a:rPr lang="en-US" dirty="0" err="1"/>
+              <a:t>Sagemaker</a:t>
+            </a:r>
+            <a:r>
+              <a:rPr lang="en-US" dirty="0"/>
+              <a:t> endpoint</a:t>
+            </a:r>
+            <a:endParaRPr dirty="0"/>
+          </a:p>
+          <a:p>
+            <a:pPr lvl="0"/>
+            <a:r>
+              <a:rPr lang="en-US" dirty="0"/>
+              <a:t>Inference [Bedrock </a:t>
+            </a:r>
+            <a:r>
+              <a:rPr lang="en-US"/>
+              <a:t>/ Sagemaker </a:t>
+            </a:r>
+            <a:r>
+              <a:rPr lang="en-US" dirty="0"/>
+              <a:t>endpoint]</a:t>
+            </a:r>
+          </a:p>
+          <a:p>
+            <a:pPr lvl="0"/>
+            <a:r>
+              <a:rPr lang="en-US" dirty="0"/>
+              <a:t>LLM-as-a-judge</a:t>
+            </a:r>
+          </a:p>
+          <a:p>
+            <a:pPr lvl="0"/>
+            <a:r>
+              <a:rPr lang="en-US" dirty="0"/>
+              <a:t>Human-as-a-judge [</a:t>
+            </a:r>
+            <a:r>
+              <a:rPr lang="en-US" dirty="0" err="1"/>
+              <a:t>Mturk</a:t>
+            </a:r>
+            <a:r>
+              <a:rPr lang="en-US" dirty="0"/>
+              <a:t> / colleagues]</a:t>
+            </a:r>
+            <a:endParaRPr dirty="0"/>
+          </a:p>
+        </p:txBody>
+      </p:sp>
+      <p:pic>
+        <p:nvPicPr>
+          <p:cNvPr id="4" name="Picture 3">
+            <a:extLst>
+              <a:ext uri="{FF2B5EF4-FFF2-40B4-BE49-F238E27FC236}">
+                <a16:creationId xmlns:a16="http://schemas.microsoft.com/office/drawing/2014/main" id="{5392E2A0-9E52-9737-CB1E-284057EBE673}"/>
+              </a:ext>
+            </a:extLst>
+          </p:cNvPr>
+          <p:cNvPicPr>
+            <a:picLocks noChangeAspect="1"/>
+          </p:cNvPicPr>
+          <p:nvPr/>
+        </p:nvPicPr>
+        <p:blipFill>
+          <a:blip r:embed="rId2"/>
+          <a:stretch>
+            <a:fillRect/>
+          </a:stretch>
+        </p:blipFill>
+        <p:spPr>
+          <a:xfrm>
+            <a:off x="5259557" y="0"/>
+            <a:ext cx="3884443" cy="5143500"/>
+          </a:xfrm>
+          <a:prstGeom prst="rect">
+            <a:avLst/>
+          </a:prstGeom>
+        </p:spPr>
+      </p:pic>
+    </p:spTree>
+    <p:extLst>
+      <p:ext uri="{BB962C8B-B14F-4D97-AF65-F5344CB8AC3E}">
+        <p14:creationId xmlns:p14="http://schemas.microsoft.com/office/powerpoint/2010/main" val="1854048025"/>
+      </p:ext>
+    </p:extLst>
+  </p:cSld>
+  <p:clrMapOvr>
+    <a:masterClrMapping/>
+  </p:clrMapOvr>
+</p:sld>
+</file>
+
+<file path=ppt/slides/slide12.xml><?xml version="1.0" encoding="utf-8"?>
+<p:sld xmlns:a="http://schemas.openxmlformats.org/drawingml/2006/main" xmlns:r="http://schemas.openxmlformats.org/officeDocument/2006/relationships" xmlns:p="http://schemas.openxmlformats.org/presentationml/2006/main">
+  <p:cSld>
+    <p:spTree>
+      <p:nvGrpSpPr>
+        <p:cNvPr id="1" name="">
+          <a:extLst>
+            <a:ext uri="{FF2B5EF4-FFF2-40B4-BE49-F238E27FC236}">
+              <a16:creationId xmlns:a16="http://schemas.microsoft.com/office/drawing/2014/main" id="{58B6E768-968A-3279-66ED-6D5B595D523B}"/>
+            </a:ext>
+          </a:extLst>
+        </p:cNvPr>
+        <p:cNvGrpSpPr/>
+        <p:nvPr/>
+      </p:nvGrpSpPr>
+      <p:grpSpPr>
+        <a:xfrm>
+          <a:off x="0" y="0"/>
+          <a:ext cx="0" cy="0"/>
+          <a:chOff x="0" y="0"/>
+          <a:chExt cx="0" cy="0"/>
+        </a:xfrm>
+      </p:grpSpPr>
+      <p:pic>
+        <p:nvPicPr>
+          <p:cNvPr id="10" name="Picture 9">
+            <a:extLst>
+              <a:ext uri="{FF2B5EF4-FFF2-40B4-BE49-F238E27FC236}">
+                <a16:creationId xmlns:a16="http://schemas.microsoft.com/office/drawing/2014/main" id="{F810250F-C618-8C13-44E5-124C2062D924}"/>
+              </a:ext>
+            </a:extLst>
+          </p:cNvPr>
+          <p:cNvPicPr>
+            <a:picLocks noChangeAspect="1"/>
+          </p:cNvPicPr>
+          <p:nvPr/>
+        </p:nvPicPr>
+        <p:blipFill>
+          <a:blip r:embed="rId2"/>
+          <a:stretch>
+            <a:fillRect/>
+          </a:stretch>
+        </p:blipFill>
+        <p:spPr>
+          <a:xfrm>
+            <a:off x="3635766" y="0"/>
+            <a:ext cx="5508234" cy="5143500"/>
+          </a:xfrm>
+          <a:prstGeom prst="rect">
+            <a:avLst/>
+          </a:prstGeom>
+        </p:spPr>
+      </p:pic>
+      <p:sp>
+        <p:nvSpPr>
+          <p:cNvPr id="2" name="Title 1">
+            <a:extLst>
+              <a:ext uri="{FF2B5EF4-FFF2-40B4-BE49-F238E27FC236}">
+                <a16:creationId xmlns:a16="http://schemas.microsoft.com/office/drawing/2014/main" id="{0639077C-6EC0-E959-DAE3-B6FF7DD15EFC}"/>
+              </a:ext>
+            </a:extLst>
+          </p:cNvPr>
+          <p:cNvSpPr>
+            <a:spLocks noGrp="1"/>
+          </p:cNvSpPr>
+          <p:nvPr>
+            <p:ph type="title"/>
+          </p:nvPr>
+        </p:nvSpPr>
+        <p:spPr/>
+        <p:txBody>
+          <a:bodyPr/>
+          <a:lstStyle/>
+          <a:p>
+            <a:pPr marL="0" lvl="0" indent="0">
+              <a:buNone/>
+            </a:pPr>
+            <a:r>
+              <a:rPr lang="en-US" dirty="0"/>
+              <a:t>The WRAVAL Pipeline</a:t>
+            </a:r>
+            <a:endParaRPr dirty="0"/>
+          </a:p>
+        </p:txBody>
+      </p:sp>
+      <p:sp>
+        <p:nvSpPr>
+          <p:cNvPr id="3" name="Content Placeholder 2">
+            <a:extLst>
+              <a:ext uri="{FF2B5EF4-FFF2-40B4-BE49-F238E27FC236}">
+                <a16:creationId xmlns:a16="http://schemas.microsoft.com/office/drawing/2014/main" id="{45C6EBC6-8A19-308B-5AD7-02C02990C61E}"/>
+              </a:ext>
+            </a:extLst>
+          </p:cNvPr>
+          <p:cNvSpPr>
+            <a:spLocks noGrp="1"/>
+          </p:cNvSpPr>
+          <p:nvPr>
+            <p:ph idx="1"/>
+          </p:nvPr>
+        </p:nvSpPr>
+        <p:spPr>
+          <a:xfrm>
+            <a:off x="381000" y="1042991"/>
+            <a:ext cx="7696200" cy="3252074"/>
+          </a:xfrm>
+        </p:spPr>
+        <p:txBody>
+          <a:bodyPr/>
+          <a:lstStyle/>
+          <a:p>
+            <a:pPr lvl="0">
+              <a:buFont typeface="Wingdings" pitchFamily="2" charset="2"/>
+              <a:buChar char="ü"/>
+            </a:pPr>
+            <a:r>
+              <a:rPr lang="en-US" dirty="0"/>
+              <a:t>Synthetic data generation</a:t>
+            </a:r>
+          </a:p>
+          <a:p>
+            <a:pPr lvl="0">
+              <a:buFont typeface="Wingdings" pitchFamily="2" charset="2"/>
+              <a:buChar char="ü"/>
+            </a:pPr>
+            <a:r>
+              <a:rPr lang="en-US" dirty="0"/>
+              <a:t>Deploy </a:t>
+            </a:r>
+            <a:r>
+              <a:rPr lang="en-US" dirty="0" err="1"/>
+              <a:t>Sagemaker</a:t>
+            </a:r>
+            <a:r>
+              <a:rPr lang="en-US" dirty="0"/>
+              <a:t> endpoint</a:t>
+            </a:r>
+            <a:endParaRPr dirty="0"/>
+          </a:p>
+          <a:p>
+            <a:pPr lvl="0">
+              <a:buFont typeface="Wingdings" pitchFamily="2" charset="2"/>
+              <a:buChar char="ü"/>
+            </a:pPr>
+            <a:r>
+              <a:rPr lang="en-US" dirty="0"/>
+              <a:t>Inference [Bedrock / </a:t>
+            </a:r>
+            <a:r>
+              <a:rPr lang="en-US" dirty="0" err="1"/>
+              <a:t>Sagemaker</a:t>
+            </a:r>
+            <a:r>
+              <a:rPr lang="en-US" dirty="0"/>
+              <a:t> endpoint]</a:t>
+            </a:r>
+          </a:p>
+          <a:p>
+            <a:pPr lvl="0"/>
+            <a:r>
+              <a:rPr lang="en-US" dirty="0"/>
+              <a:t>LLM-as-a-judge</a:t>
+            </a:r>
+          </a:p>
+          <a:p>
+            <a:pPr lvl="0"/>
+            <a:r>
+              <a:rPr lang="en-US" dirty="0"/>
+              <a:t>Human-as-a-judge [</a:t>
+            </a:r>
+            <a:r>
+              <a:rPr lang="en-US" dirty="0" err="1"/>
+              <a:t>Mturk</a:t>
+            </a:r>
+            <a:r>
+              <a:rPr lang="en-US" dirty="0"/>
+              <a:t> / colleagues]</a:t>
+            </a:r>
+            <a:endParaRPr dirty="0"/>
+          </a:p>
+        </p:txBody>
+      </p:sp>
+    </p:spTree>
+    <p:extLst>
+      <p:ext uri="{BB962C8B-B14F-4D97-AF65-F5344CB8AC3E}">
+        <p14:creationId xmlns:p14="http://schemas.microsoft.com/office/powerpoint/2010/main" val="3260937568"/>
+      </p:ext>
+    </p:extLst>
+  </p:cSld>
+  <p:clrMapOvr>
+    <a:masterClrMapping/>
+  </p:clrMapOvr>
+</p:sld>
+</file>
+
+<file path=ppt/slides/slide13.xml><?xml version="1.0" encoding="utf-8"?>
+<p:sld xmlns:a="http://schemas.openxmlformats.org/drawingml/2006/main" xmlns:r="http://schemas.openxmlformats.org/officeDocument/2006/relationships" xmlns:p="http://schemas.openxmlformats.org/presentationml/2006/main">
+  <p:cSld>
+    <p:spTree>
+      <p:nvGrpSpPr>
+        <p:cNvPr id="1" name="">
+          <a:extLst>
+            <a:ext uri="{FF2B5EF4-FFF2-40B4-BE49-F238E27FC236}">
+              <a16:creationId xmlns:a16="http://schemas.microsoft.com/office/drawing/2014/main" id="{9AD9C708-D8AE-D34D-4958-182AED0F3E7E}"/>
+            </a:ext>
+          </a:extLst>
+        </p:cNvPr>
+        <p:cNvGrpSpPr/>
+        <p:nvPr/>
+      </p:nvGrpSpPr>
+      <p:grpSpPr>
+        <a:xfrm>
+          <a:off x="0" y="0"/>
+          <a:ext cx="0" cy="0"/>
+          <a:chOff x="0" y="0"/>
+          <a:chExt cx="0" cy="0"/>
+        </a:xfrm>
+      </p:grpSpPr>
+      <p:pic>
+        <p:nvPicPr>
+          <p:cNvPr id="5" name="Picture 4">
+            <a:extLst>
+              <a:ext uri="{FF2B5EF4-FFF2-40B4-BE49-F238E27FC236}">
+                <a16:creationId xmlns:a16="http://schemas.microsoft.com/office/drawing/2014/main" id="{1410FC8F-F5DE-003A-427B-DE17566A4B0F}"/>
+              </a:ext>
+            </a:extLst>
+          </p:cNvPr>
+          <p:cNvPicPr>
+            <a:picLocks noChangeAspect="1"/>
+          </p:cNvPicPr>
+          <p:nvPr/>
+        </p:nvPicPr>
+        <p:blipFill>
+          <a:blip r:embed="rId2"/>
+          <a:stretch>
+            <a:fillRect/>
+          </a:stretch>
+        </p:blipFill>
+        <p:spPr>
+          <a:xfrm>
+            <a:off x="3400063" y="0"/>
+            <a:ext cx="5743937" cy="5143500"/>
+          </a:xfrm>
+          <a:prstGeom prst="rect">
+            <a:avLst/>
+          </a:prstGeom>
+        </p:spPr>
+      </p:pic>
+      <p:sp>
+        <p:nvSpPr>
+          <p:cNvPr id="2" name="Title 1">
+            <a:extLst>
+              <a:ext uri="{FF2B5EF4-FFF2-40B4-BE49-F238E27FC236}">
+                <a16:creationId xmlns:a16="http://schemas.microsoft.com/office/drawing/2014/main" id="{9063F71F-69C0-0170-DAF8-0F1418DC33ED}"/>
+              </a:ext>
+            </a:extLst>
+          </p:cNvPr>
+          <p:cNvSpPr>
+            <a:spLocks noGrp="1"/>
+          </p:cNvSpPr>
+          <p:nvPr>
+            <p:ph type="title"/>
+          </p:nvPr>
+        </p:nvSpPr>
+        <p:spPr/>
+        <p:txBody>
+          <a:bodyPr/>
+          <a:lstStyle/>
+          <a:p>
+            <a:pPr marL="0" lvl="0" indent="0">
+              <a:buNone/>
+            </a:pPr>
+            <a:r>
+              <a:rPr lang="en-US" dirty="0"/>
+              <a:t>The WRAVAL Pipeline</a:t>
+            </a:r>
+            <a:endParaRPr dirty="0"/>
+          </a:p>
+        </p:txBody>
+      </p:sp>
+      <p:sp>
+        <p:nvSpPr>
+          <p:cNvPr id="3" name="Content Placeholder 2">
+            <a:extLst>
+              <a:ext uri="{FF2B5EF4-FFF2-40B4-BE49-F238E27FC236}">
+                <a16:creationId xmlns:a16="http://schemas.microsoft.com/office/drawing/2014/main" id="{CEDF1FF9-7AE4-31B7-AAB0-E1ECE5E16616}"/>
+              </a:ext>
+            </a:extLst>
+          </p:cNvPr>
+          <p:cNvSpPr>
+            <a:spLocks noGrp="1"/>
+          </p:cNvSpPr>
+          <p:nvPr>
+            <p:ph idx="1"/>
+          </p:nvPr>
+        </p:nvSpPr>
+        <p:spPr>
+          <a:xfrm>
+            <a:off x="381000" y="1042991"/>
+            <a:ext cx="7696200" cy="3252074"/>
+          </a:xfrm>
+        </p:spPr>
+        <p:txBody>
+          <a:bodyPr/>
+          <a:lstStyle/>
+          <a:p>
+            <a:pPr lvl="0">
+              <a:buFont typeface="Wingdings" pitchFamily="2" charset="2"/>
+              <a:buChar char="ü"/>
+            </a:pPr>
+            <a:r>
+              <a:rPr lang="en-US" dirty="0"/>
+              <a:t>Synthetic data generation</a:t>
+            </a:r>
+          </a:p>
+          <a:p>
+            <a:pPr lvl="0">
+              <a:buFont typeface="Wingdings" pitchFamily="2" charset="2"/>
+              <a:buChar char="ü"/>
+            </a:pPr>
+            <a:r>
+              <a:rPr lang="en-US" dirty="0"/>
+              <a:t>Deploy </a:t>
+            </a:r>
+            <a:r>
+              <a:rPr lang="en-US" dirty="0" err="1"/>
+              <a:t>Sagemaker</a:t>
+            </a:r>
+            <a:r>
+              <a:rPr lang="en-US" dirty="0"/>
+              <a:t> endpoint</a:t>
+            </a:r>
+            <a:endParaRPr dirty="0"/>
+          </a:p>
+          <a:p>
+            <a:pPr lvl="0">
+              <a:buFont typeface="Wingdings" pitchFamily="2" charset="2"/>
+              <a:buChar char="ü"/>
+            </a:pPr>
+            <a:r>
+              <a:rPr lang="en-US" dirty="0"/>
+              <a:t>Inference [Bedrock / </a:t>
+            </a:r>
+            <a:r>
+              <a:rPr lang="en-US" dirty="0" err="1"/>
+              <a:t>Sagemaker</a:t>
+            </a:r>
+            <a:r>
+              <a:rPr lang="en-US" dirty="0"/>
+              <a:t> endpoint]</a:t>
+            </a:r>
+          </a:p>
+          <a:p>
+            <a:pPr lvl="0">
+              <a:buFont typeface="Wingdings" pitchFamily="2" charset="2"/>
+              <a:buChar char="ü"/>
+            </a:pPr>
+            <a:r>
+              <a:rPr lang="en-US" dirty="0"/>
+              <a:t>LLM-as-a-judge</a:t>
+            </a:r>
+          </a:p>
+          <a:p>
+            <a:pPr lvl="0"/>
+            <a:r>
+              <a:rPr lang="en-US" dirty="0"/>
+              <a:t>Human-as-a-judge [</a:t>
+            </a:r>
+            <a:r>
+              <a:rPr lang="en-US" dirty="0" err="1"/>
+              <a:t>Mturk</a:t>
+            </a:r>
+            <a:r>
+              <a:rPr lang="en-US" dirty="0"/>
+              <a:t> / colleagues]</a:t>
+            </a:r>
+            <a:endParaRPr dirty="0"/>
+          </a:p>
+        </p:txBody>
+      </p:sp>
+    </p:spTree>
+    <p:extLst>
+      <p:ext uri="{BB962C8B-B14F-4D97-AF65-F5344CB8AC3E}">
+        <p14:creationId xmlns:p14="http://schemas.microsoft.com/office/powerpoint/2010/main" val="3006474389"/>
+      </p:ext>
+    </p:extLst>
+  </p:cSld>
+  <p:clrMapOvr>
+    <a:masterClrMapping/>
+  </p:clrMapOvr>
+</p:sld>
+</file>
+
+<file path=ppt/slides/slide14.xml><?xml version="1.0" encoding="utf-8"?>
+<p:sld xmlns:a="http://schemas.openxmlformats.org/drawingml/2006/main" xmlns:r="http://schemas.openxmlformats.org/officeDocument/2006/relationships" xmlns:p="http://schemas.openxmlformats.org/presentationml/2006/main">
+  <p:cSld>
+    <p:spTree>
+      <p:nvGrpSpPr>
+        <p:cNvPr id="1" name="">
+          <a:extLst>
+            <a:ext uri="{FF2B5EF4-FFF2-40B4-BE49-F238E27FC236}">
+              <a16:creationId xmlns:a16="http://schemas.microsoft.com/office/drawing/2014/main" id="{3F10CBC2-B39B-F998-41ED-BED1C116C490}"/>
+            </a:ext>
+          </a:extLst>
+        </p:cNvPr>
+        <p:cNvGrpSpPr/>
+        <p:nvPr/>
+      </p:nvGrpSpPr>
+      <p:grpSpPr>
+        <a:xfrm>
+          <a:off x="0" y="0"/>
+          <a:ext cx="0" cy="0"/>
+          <a:chOff x="0" y="0"/>
+          <a:chExt cx="0" cy="0"/>
+        </a:xfrm>
+      </p:grpSpPr>
+      <p:sp>
+        <p:nvSpPr>
+          <p:cNvPr id="2" name="Title 1">
+            <a:extLst>
+              <a:ext uri="{FF2B5EF4-FFF2-40B4-BE49-F238E27FC236}">
+                <a16:creationId xmlns:a16="http://schemas.microsoft.com/office/drawing/2014/main" id="{E9115CA6-65E5-0D69-C233-A16E96F538E6}"/>
+              </a:ext>
+            </a:extLst>
+          </p:cNvPr>
+          <p:cNvSpPr>
+            <a:spLocks noGrp="1"/>
+          </p:cNvSpPr>
+          <p:nvPr>
+            <p:ph type="title"/>
+          </p:nvPr>
+        </p:nvSpPr>
+        <p:spPr/>
+        <p:txBody>
+          <a:bodyPr/>
+          <a:lstStyle/>
+          <a:p>
+            <a:pPr marL="0" lvl="0" indent="0">
+              <a:buNone/>
+            </a:pPr>
+            <a:r>
+              <a:rPr lang="en-US" dirty="0"/>
+              <a:t>The WRAVAL Pipeline</a:t>
+            </a:r>
+            <a:endParaRPr dirty="0"/>
+          </a:p>
+        </p:txBody>
+      </p:sp>
+      <p:sp>
+        <p:nvSpPr>
+          <p:cNvPr id="3" name="Content Placeholder 2">
+            <a:extLst>
+              <a:ext uri="{FF2B5EF4-FFF2-40B4-BE49-F238E27FC236}">
+                <a16:creationId xmlns:a16="http://schemas.microsoft.com/office/drawing/2014/main" id="{F673656C-4713-928A-FC24-8E7A0D44FEE8}"/>
+              </a:ext>
+            </a:extLst>
+          </p:cNvPr>
+          <p:cNvSpPr>
+            <a:spLocks noGrp="1"/>
+          </p:cNvSpPr>
+          <p:nvPr>
+            <p:ph idx="1"/>
+          </p:nvPr>
+        </p:nvSpPr>
+        <p:spPr>
+          <a:xfrm>
+            <a:off x="381000" y="1042991"/>
+            <a:ext cx="7696200" cy="3252074"/>
+          </a:xfrm>
+        </p:spPr>
+        <p:txBody>
+          <a:bodyPr/>
+          <a:lstStyle/>
+          <a:p>
+            <a:pPr lvl="0">
+              <a:buFont typeface="Wingdings" pitchFamily="2" charset="2"/>
+              <a:buChar char="ü"/>
+            </a:pPr>
+            <a:r>
+              <a:rPr lang="en-US" dirty="0"/>
+              <a:t>Synthetic data generation</a:t>
+            </a:r>
+          </a:p>
+          <a:p>
+            <a:pPr lvl="0">
+              <a:buFont typeface="Wingdings" pitchFamily="2" charset="2"/>
+              <a:buChar char="ü"/>
+            </a:pPr>
+            <a:r>
+              <a:rPr lang="en-US" dirty="0"/>
+              <a:t>Deploy </a:t>
+            </a:r>
+            <a:r>
+              <a:rPr lang="en-US" dirty="0" err="1"/>
+              <a:t>Sagemaker</a:t>
+            </a:r>
+            <a:r>
+              <a:rPr lang="en-US" dirty="0"/>
+              <a:t> endpoint</a:t>
+            </a:r>
+            <a:endParaRPr dirty="0"/>
+          </a:p>
+          <a:p>
+            <a:pPr lvl="0">
+              <a:buFont typeface="Wingdings" pitchFamily="2" charset="2"/>
+              <a:buChar char="ü"/>
+            </a:pPr>
+            <a:r>
+              <a:rPr lang="en-US" dirty="0"/>
+              <a:t>Inference [Bedrock / </a:t>
+            </a:r>
+            <a:r>
+              <a:rPr lang="en-US" dirty="0" err="1"/>
+              <a:t>Sagemaker</a:t>
+            </a:r>
+            <a:r>
+              <a:rPr lang="en-US" dirty="0"/>
+              <a:t> endpoint]</a:t>
+            </a:r>
+          </a:p>
+          <a:p>
+            <a:pPr lvl="0">
+              <a:buFont typeface="Wingdings" pitchFamily="2" charset="2"/>
+              <a:buChar char="ü"/>
+            </a:pPr>
+            <a:r>
+              <a:rPr lang="en-US" dirty="0"/>
+              <a:t>LLM-as-a-judge</a:t>
+            </a:r>
+          </a:p>
+          <a:p>
+            <a:pPr lvl="0"/>
+            <a:r>
+              <a:rPr lang="en-US" dirty="0"/>
+              <a:t>Human-as-a-judge [</a:t>
+            </a:r>
+            <a:r>
+              <a:rPr lang="en-US" dirty="0" err="1"/>
+              <a:t>Mturk</a:t>
+            </a:r>
+            <a:r>
+              <a:rPr lang="en-US" dirty="0"/>
+              <a:t> / colleagues]</a:t>
+            </a:r>
+            <a:endParaRPr dirty="0"/>
+          </a:p>
+        </p:txBody>
+      </p:sp>
+      <p:pic>
+        <p:nvPicPr>
+          <p:cNvPr id="8" name="Picture 7">
+            <a:extLst>
+              <a:ext uri="{FF2B5EF4-FFF2-40B4-BE49-F238E27FC236}">
+                <a16:creationId xmlns:a16="http://schemas.microsoft.com/office/drawing/2014/main" id="{9EA774F0-89E8-13AE-DD86-1D313DE91725}"/>
+              </a:ext>
+            </a:extLst>
+          </p:cNvPr>
+          <p:cNvPicPr>
+            <a:picLocks noChangeAspect="1"/>
+          </p:cNvPicPr>
+          <p:nvPr/>
+        </p:nvPicPr>
+        <p:blipFill>
+          <a:blip r:embed="rId2"/>
+          <a:stretch>
+            <a:fillRect/>
+          </a:stretch>
+        </p:blipFill>
+        <p:spPr>
+          <a:xfrm>
+            <a:off x="3980992" y="0"/>
+            <a:ext cx="5163008" cy="5143500"/>
+          </a:xfrm>
+          <a:prstGeom prst="rect">
+            <a:avLst/>
+          </a:prstGeom>
+        </p:spPr>
+      </p:pic>
+    </p:spTree>
+    <p:extLst>
+      <p:ext uri="{BB962C8B-B14F-4D97-AF65-F5344CB8AC3E}">
+        <p14:creationId xmlns:p14="http://schemas.microsoft.com/office/powerpoint/2010/main" val="1668198248"/>
+      </p:ext>
+    </p:extLst>
+  </p:cSld>
+  <p:clrMapOvr>
+    <a:masterClrMapping/>
+  </p:clrMapOvr>
+</p:sld>
+</file>
+
+<file path=ppt/slides/slide15.xml><?xml version="1.0" encoding="utf-8"?>
+<p:sld xmlns:a="http://schemas.openxmlformats.org/drawingml/2006/main" xmlns:r="http://schemas.openxmlformats.org/officeDocument/2006/relationships" xmlns:p="http://schemas.openxmlformats.org/presentationml/2006/main">
+  <p:cSld>
+    <p:spTree>
+      <p:nvGrpSpPr>
+        <p:cNvPr id="1" name="">
+          <a:extLst>
+            <a:ext uri="{FF2B5EF4-FFF2-40B4-BE49-F238E27FC236}">
+              <a16:creationId xmlns:a16="http://schemas.microsoft.com/office/drawing/2014/main" id="{94F99DCB-1554-F68A-7484-027350410B66}"/>
+            </a:ext>
+          </a:extLst>
+        </p:cNvPr>
+        <p:cNvGrpSpPr/>
+        <p:nvPr/>
+      </p:nvGrpSpPr>
+      <p:grpSpPr>
+        <a:xfrm>
+          <a:off x="0" y="0"/>
+          <a:ext cx="0" cy="0"/>
+          <a:chOff x="0" y="0"/>
+          <a:chExt cx="0" cy="0"/>
+        </a:xfrm>
+      </p:grpSpPr>
+      <p:pic>
+        <p:nvPicPr>
+          <p:cNvPr id="7" name="Picture 6">
+            <a:extLst>
+              <a:ext uri="{FF2B5EF4-FFF2-40B4-BE49-F238E27FC236}">
+                <a16:creationId xmlns:a16="http://schemas.microsoft.com/office/drawing/2014/main" id="{46E1F239-73D9-36A9-8828-2FE9EB144EF6}"/>
+              </a:ext>
+            </a:extLst>
+          </p:cNvPr>
+          <p:cNvPicPr>
+            <a:picLocks noChangeAspect="1"/>
+          </p:cNvPicPr>
+          <p:nvPr/>
+        </p:nvPicPr>
+        <p:blipFill>
+          <a:blip r:embed="rId2"/>
+          <a:stretch>
+            <a:fillRect/>
+          </a:stretch>
+        </p:blipFill>
+        <p:spPr>
+          <a:xfrm>
+            <a:off x="3406588" y="724142"/>
+            <a:ext cx="5737412" cy="4419358"/>
+          </a:xfrm>
+          <a:prstGeom prst="rect">
+            <a:avLst/>
+          </a:prstGeom>
+        </p:spPr>
+      </p:pic>
+      <p:sp>
+        <p:nvSpPr>
+          <p:cNvPr id="2" name="Title 1">
+            <a:extLst>
+              <a:ext uri="{FF2B5EF4-FFF2-40B4-BE49-F238E27FC236}">
+                <a16:creationId xmlns:a16="http://schemas.microsoft.com/office/drawing/2014/main" id="{7F552AA1-64C6-66AA-247B-19C2F6A92169}"/>
+              </a:ext>
+            </a:extLst>
+          </p:cNvPr>
+          <p:cNvSpPr>
+            <a:spLocks noGrp="1"/>
+          </p:cNvSpPr>
+          <p:nvPr>
+            <p:ph type="title"/>
+          </p:nvPr>
+        </p:nvSpPr>
+        <p:spPr/>
+        <p:txBody>
+          <a:bodyPr/>
+          <a:lstStyle/>
+          <a:p>
+            <a:pPr marL="0" lvl="0" indent="0">
+              <a:buNone/>
+            </a:pPr>
+            <a:r>
+              <a:rPr lang="en-US" dirty="0"/>
+              <a:t>The WRAVAL Pipeline</a:t>
+            </a:r>
+            <a:endParaRPr dirty="0"/>
+          </a:p>
+        </p:txBody>
+      </p:sp>
+      <p:sp>
+        <p:nvSpPr>
+          <p:cNvPr id="3" name="Content Placeholder 2">
+            <a:extLst>
+              <a:ext uri="{FF2B5EF4-FFF2-40B4-BE49-F238E27FC236}">
+                <a16:creationId xmlns:a16="http://schemas.microsoft.com/office/drawing/2014/main" id="{30F6ED67-8FA2-67B5-5CDB-3A0EF108EA5A}"/>
+              </a:ext>
+            </a:extLst>
+          </p:cNvPr>
+          <p:cNvSpPr>
+            <a:spLocks noGrp="1"/>
+          </p:cNvSpPr>
+          <p:nvPr>
+            <p:ph idx="1"/>
+          </p:nvPr>
+        </p:nvSpPr>
+        <p:spPr>
+          <a:xfrm>
+            <a:off x="381000" y="1042991"/>
+            <a:ext cx="7696200" cy="3252074"/>
+          </a:xfrm>
+        </p:spPr>
+        <p:txBody>
+          <a:bodyPr/>
+          <a:lstStyle/>
+          <a:p>
+            <a:pPr lvl="0">
+              <a:buFont typeface="Wingdings" pitchFamily="2" charset="2"/>
+              <a:buChar char="ü"/>
+            </a:pPr>
+            <a:r>
+              <a:rPr lang="en-US" dirty="0"/>
+              <a:t>Synthetic data generation</a:t>
+            </a:r>
+          </a:p>
+          <a:p>
+            <a:pPr lvl="0">
+              <a:buFont typeface="Wingdings" pitchFamily="2" charset="2"/>
+              <a:buChar char="ü"/>
+            </a:pPr>
+            <a:r>
+              <a:rPr lang="en-US" dirty="0"/>
+              <a:t>Deploy </a:t>
+            </a:r>
+            <a:r>
+              <a:rPr lang="en-US" dirty="0" err="1"/>
+              <a:t>Sagemaker</a:t>
+            </a:r>
+            <a:r>
+              <a:rPr lang="en-US" dirty="0"/>
+              <a:t> endpoint</a:t>
+            </a:r>
+            <a:endParaRPr dirty="0"/>
+          </a:p>
+          <a:p>
+            <a:pPr lvl="0">
+              <a:buFont typeface="Wingdings" pitchFamily="2" charset="2"/>
+              <a:buChar char="ü"/>
+            </a:pPr>
+            <a:r>
+              <a:rPr lang="en-US" dirty="0"/>
+              <a:t>Inference [Bedrock / </a:t>
+            </a:r>
+            <a:r>
+              <a:rPr lang="en-US" dirty="0" err="1"/>
+              <a:t>Sagemaker</a:t>
+            </a:r>
+            <a:r>
+              <a:rPr lang="en-US" dirty="0"/>
+              <a:t> endpoint]</a:t>
+            </a:r>
+          </a:p>
+          <a:p>
+            <a:pPr lvl="0">
+              <a:buFont typeface="Wingdings" pitchFamily="2" charset="2"/>
+              <a:buChar char="ü"/>
+            </a:pPr>
+            <a:r>
+              <a:rPr lang="en-US" dirty="0"/>
+              <a:t>LLM-as-a-judge</a:t>
+            </a:r>
+          </a:p>
+          <a:p>
+            <a:pPr lvl="0">
+              <a:buFont typeface="Wingdings" pitchFamily="2" charset="2"/>
+              <a:buChar char="ü"/>
+            </a:pPr>
+            <a:r>
+              <a:rPr lang="en-US" dirty="0"/>
+              <a:t>Human-as-a-judge [</a:t>
+            </a:r>
+            <a:r>
+              <a:rPr lang="en-US" dirty="0" err="1"/>
+              <a:t>Mturk</a:t>
+            </a:r>
+            <a:r>
+              <a:rPr lang="en-US" dirty="0"/>
+              <a:t> / colleagues]</a:t>
+            </a:r>
+            <a:endParaRPr dirty="0"/>
+          </a:p>
+        </p:txBody>
+      </p:sp>
+    </p:spTree>
+    <p:extLst>
+      <p:ext uri="{BB962C8B-B14F-4D97-AF65-F5344CB8AC3E}">
+        <p14:creationId xmlns:p14="http://schemas.microsoft.com/office/powerpoint/2010/main" val="3958005631"/>
+      </p:ext>
+    </p:extLst>
+  </p:cSld>
+  <p:clrMapOvr>
+    <a:masterClrMapping/>
+  </p:clrMapOvr>
+</p:sld>
+</file>
+
+<file path=ppt/slides/slide16.xml><?xml version="1.0" encoding="utf-8"?>
+<p:sld xmlns:a="http://schemas.openxmlformats.org/drawingml/2006/main" xmlns:r="http://schemas.openxmlformats.org/officeDocument/2006/relationships" xmlns:p="http://schemas.openxmlformats.org/presentationml/2006/main">
+  <p:cSld>
+    <p:spTree>
+      <p:nvGrpSpPr>
+        <p:cNvPr id="1" name="">
+          <a:extLst>
+            <a:ext uri="{FF2B5EF4-FFF2-40B4-BE49-F238E27FC236}">
+              <a16:creationId xmlns:a16="http://schemas.microsoft.com/office/drawing/2014/main" id="{44F87C90-A239-9F9B-DCB9-BA4BB3D91A2E}"/>
+            </a:ext>
+          </a:extLst>
+        </p:cNvPr>
+        <p:cNvGrpSpPr/>
+        <p:nvPr/>
+      </p:nvGrpSpPr>
+      <p:grpSpPr>
+        <a:xfrm>
+          <a:off x="0" y="0"/>
+          <a:ext cx="0" cy="0"/>
+          <a:chOff x="0" y="0"/>
+          <a:chExt cx="0" cy="0"/>
+        </a:xfrm>
+      </p:grpSpPr>
+      <p:sp>
+        <p:nvSpPr>
+          <p:cNvPr id="2" name="Title 1">
+            <a:extLst>
+              <a:ext uri="{FF2B5EF4-FFF2-40B4-BE49-F238E27FC236}">
+                <a16:creationId xmlns:a16="http://schemas.microsoft.com/office/drawing/2014/main" id="{FA39D34E-1CFB-0561-4BE5-A535D5157FA6}"/>
+              </a:ext>
+            </a:extLst>
+          </p:cNvPr>
+          <p:cNvSpPr>
+            <a:spLocks noGrp="1"/>
+          </p:cNvSpPr>
+          <p:nvPr>
+            <p:ph type="title"/>
+          </p:nvPr>
+        </p:nvSpPr>
+        <p:spPr/>
+        <p:txBody>
+          <a:bodyPr/>
+          <a:lstStyle/>
+          <a:p>
+            <a:pPr marL="0" lvl="0" indent="0">
+              <a:buNone/>
+            </a:pPr>
+            <a:r>
+              <a:rPr lang="en-US" dirty="0"/>
+              <a:t>The WRAVAL Pipeline</a:t>
+            </a:r>
+            <a:endParaRPr dirty="0"/>
+          </a:p>
+        </p:txBody>
+      </p:sp>
+      <p:sp>
+        <p:nvSpPr>
+          <p:cNvPr id="3" name="Content Placeholder 2">
+            <a:extLst>
+              <a:ext uri="{FF2B5EF4-FFF2-40B4-BE49-F238E27FC236}">
+                <a16:creationId xmlns:a16="http://schemas.microsoft.com/office/drawing/2014/main" id="{E1FE54D2-F3C9-794A-63D2-2180397C7B97}"/>
+              </a:ext>
+            </a:extLst>
+          </p:cNvPr>
+          <p:cNvSpPr>
+            <a:spLocks noGrp="1"/>
+          </p:cNvSpPr>
+          <p:nvPr>
+            <p:ph idx="1"/>
+          </p:nvPr>
+        </p:nvSpPr>
+        <p:spPr>
+          <a:xfrm>
+            <a:off x="381000" y="1042991"/>
+            <a:ext cx="7696200" cy="3252074"/>
+          </a:xfrm>
+        </p:spPr>
+        <p:txBody>
+          <a:bodyPr/>
+          <a:lstStyle/>
+          <a:p>
+            <a:pPr lvl="0">
+              <a:buFont typeface="Wingdings" pitchFamily="2" charset="2"/>
+              <a:buChar char="ü"/>
+            </a:pPr>
+            <a:r>
+              <a:rPr lang="en-US" dirty="0"/>
+              <a:t>Synthetic data generation</a:t>
+            </a:r>
+          </a:p>
+          <a:p>
+            <a:pPr lvl="0">
+              <a:buFont typeface="Wingdings" pitchFamily="2" charset="2"/>
+              <a:buChar char="ü"/>
+            </a:pPr>
+            <a:r>
+              <a:rPr lang="en-US" dirty="0"/>
+              <a:t>Deploy </a:t>
+            </a:r>
+            <a:r>
+              <a:rPr lang="en-US" dirty="0" err="1"/>
+              <a:t>Sagemaker</a:t>
+            </a:r>
+            <a:r>
+              <a:rPr lang="en-US" dirty="0"/>
+              <a:t> endpoint</a:t>
+            </a:r>
+            <a:endParaRPr dirty="0"/>
+          </a:p>
+          <a:p>
+            <a:pPr lvl="0">
+              <a:buFont typeface="Wingdings" pitchFamily="2" charset="2"/>
+              <a:buChar char="ü"/>
+            </a:pPr>
+            <a:r>
+              <a:rPr lang="en-US" dirty="0"/>
+              <a:t>Inference [Bedrock / </a:t>
+            </a:r>
+            <a:r>
+              <a:rPr lang="en-US" dirty="0" err="1"/>
+              <a:t>Sagemaker</a:t>
+            </a:r>
+            <a:r>
+              <a:rPr lang="en-US" dirty="0"/>
+              <a:t> endpoint]</a:t>
+            </a:r>
+          </a:p>
+          <a:p>
+            <a:pPr lvl="0">
+              <a:buFont typeface="Wingdings" pitchFamily="2" charset="2"/>
+              <a:buChar char="ü"/>
+            </a:pPr>
+            <a:r>
+              <a:rPr lang="en-US" dirty="0"/>
+              <a:t>LLM-as-a-judge</a:t>
+            </a:r>
+          </a:p>
+          <a:p>
+            <a:pPr lvl="0">
+              <a:buFont typeface="Wingdings" pitchFamily="2" charset="2"/>
+              <a:buChar char="ü"/>
+            </a:pPr>
+            <a:r>
+              <a:rPr lang="en-US" dirty="0"/>
+              <a:t>Human-as-a-judge [</a:t>
+            </a:r>
+            <a:r>
+              <a:rPr lang="en-US" dirty="0" err="1"/>
+              <a:t>Mturk</a:t>
+            </a:r>
+            <a:r>
+              <a:rPr lang="en-US" dirty="0"/>
+              <a:t> / colleagues]</a:t>
+            </a:r>
+            <a:endParaRPr dirty="0"/>
+          </a:p>
+        </p:txBody>
+      </p:sp>
+      <p:pic>
+        <p:nvPicPr>
+          <p:cNvPr id="8" name="Picture 7">
+            <a:extLst>
+              <a:ext uri="{FF2B5EF4-FFF2-40B4-BE49-F238E27FC236}">
+                <a16:creationId xmlns:a16="http://schemas.microsoft.com/office/drawing/2014/main" id="{918030AD-6E29-470F-3B46-7FA1F8473B7C}"/>
+              </a:ext>
+            </a:extLst>
+          </p:cNvPr>
+          <p:cNvPicPr>
+            <a:picLocks noChangeAspect="1"/>
+          </p:cNvPicPr>
+          <p:nvPr/>
+        </p:nvPicPr>
+        <p:blipFill>
+          <a:blip r:embed="rId2"/>
+          <a:stretch>
+            <a:fillRect/>
+          </a:stretch>
+        </p:blipFill>
+        <p:spPr>
+          <a:xfrm>
+            <a:off x="4422675" y="0"/>
+            <a:ext cx="4721325" cy="5143500"/>
+          </a:xfrm>
+          <a:prstGeom prst="rect">
+            <a:avLst/>
+          </a:prstGeom>
+        </p:spPr>
+      </p:pic>
+    </p:spTree>
+    <p:extLst>
+      <p:ext uri="{BB962C8B-B14F-4D97-AF65-F5344CB8AC3E}">
+        <p14:creationId xmlns:p14="http://schemas.microsoft.com/office/powerpoint/2010/main" val="450857172"/>
+      </p:ext>
+    </p:extLst>
+  </p:cSld>
+  <p:clrMapOvr>
+    <a:masterClrMapping/>
+  </p:clrMapOvr>
+</p:sld>
+</file>
+
+<file path=ppt/slides/slide17.xml><?xml version="1.0" encoding="utf-8"?>
+<p:sld xmlns:a="http://schemas.openxmlformats.org/drawingml/2006/main" xmlns:r="http://schemas.openxmlformats.org/officeDocument/2006/relationships" xmlns:p="http://schemas.openxmlformats.org/presentationml/2006/main">
+  <p:cSld>
+    <p:spTree>
+      <p:nvGrpSpPr>
+        <p:cNvPr id="1" name=""/>
+        <p:cNvGrpSpPr/>
+        <p:nvPr/>
+      </p:nvGrpSpPr>
+      <p:grpSpPr>
+        <a:xfrm>
+          <a:off x="0" y="0"/>
+          <a:ext cx="0" cy="0"/>
+          <a:chOff x="0" y="0"/>
+          <a:chExt cx="0" cy="0"/>
+        </a:xfrm>
+      </p:grpSpPr>
+      <p:sp>
+        <p:nvSpPr>
+          <p:cNvPr id="2" name="Title 1"/>
+          <p:cNvSpPr>
+            <a:spLocks noGrp="1"/>
+          </p:cNvSpPr>
+          <p:nvPr>
+            <p:ph type="title"/>
+          </p:nvPr>
+        </p:nvSpPr>
+        <p:spPr/>
+        <p:txBody>
+          <a:bodyPr/>
+          <a:lstStyle/>
+          <a:p>
+            <a:pPr marL="0" lvl="0" indent="0">
+              <a:buNone/>
+            </a:pPr>
+            <a:r>
+              <a:rPr dirty="0"/>
+              <a:t>Key Findings</a:t>
+            </a:r>
+          </a:p>
+        </p:txBody>
+      </p:sp>
+      <p:pic>
+        <p:nvPicPr>
+          <p:cNvPr id="10" name="Picture 9">
+            <a:extLst>
+              <a:ext uri="{FF2B5EF4-FFF2-40B4-BE49-F238E27FC236}">
+                <a16:creationId xmlns:a16="http://schemas.microsoft.com/office/drawing/2014/main" id="{5752B002-744D-CF6F-0FCF-4B8B64D8F009}"/>
+              </a:ext>
+            </a:extLst>
+          </p:cNvPr>
+          <p:cNvPicPr>
+            <a:picLocks noChangeAspect="1"/>
+          </p:cNvPicPr>
+          <p:nvPr/>
+        </p:nvPicPr>
+        <p:blipFill>
+          <a:blip r:embed="rId2"/>
+          <a:stretch>
+            <a:fillRect/>
+          </a:stretch>
+        </p:blipFill>
+        <p:spPr>
+          <a:xfrm>
+            <a:off x="381000" y="1232583"/>
+            <a:ext cx="7845654" cy="1329145"/>
+          </a:xfrm>
+          <a:prstGeom prst="rect">
+            <a:avLst/>
+          </a:prstGeom>
+        </p:spPr>
+      </p:pic>
+    </p:spTree>
+  </p:cSld>
+  <p:clrMapOvr>
+    <a:masterClrMapping/>
+  </p:clrMapOvr>
+</p:sld>
+</file>
+
+<file path=ppt/slides/slide18.xml><?xml version="1.0" encoding="utf-8"?>
 <p:sld xmlns:a="http://schemas.openxmlformats.org/drawingml/2006/main" xmlns:r="http://schemas.openxmlformats.org/officeDocument/2006/relationships" xmlns:p="http://schemas.openxmlformats.org/presentationml/2006/main">
   <p:cSld>
     <p:spTree>
@@ -3862,35 +5206,81 @@
           <a:bodyPr/>
           <a:lstStyle/>
           <a:p>
-            <a:pPr lvl="0"/>
-            <a:r>
-              <a:rPr lang="en-US" dirty="0"/>
+            <a:pPr lvl="0">
+              <a:lnSpc>
+                <a:spcPct val="200000"/>
+              </a:lnSpc>
+            </a:pPr>
+            <a:r>
+              <a:rPr lang="en-US" sz="2000" dirty="0"/>
               <a:t>Implement </a:t>
             </a:r>
             <a:r>
-              <a:rPr lang="en-US" dirty="0" err="1"/>
+              <a:rPr lang="en-US" sz="2000" dirty="0" err="1"/>
               <a:t>wraval</a:t>
             </a:r>
             <a:r>
-              <a:rPr lang="en-US" dirty="0"/>
+              <a:rPr lang="en-US" sz="2000" dirty="0"/>
               <a:t> as a HF </a:t>
             </a:r>
             <a:r>
-              <a:rPr lang="en-US" dirty="0" err="1"/>
+              <a:rPr lang="en-US" sz="2000" dirty="0" err="1"/>
               <a:t>Lighteval</a:t>
             </a:r>
             <a:r>
-              <a:rPr lang="en-US" dirty="0"/>
+              <a:rPr lang="en-US" sz="2000" dirty="0"/>
               <a:t> custom task</a:t>
             </a:r>
           </a:p>
           <a:p>
-            <a:pPr lvl="0"/>
-            <a:r>
-              <a:rPr lang="en-US" dirty="0"/>
+            <a:pPr>
+              <a:lnSpc>
+                <a:spcPct val="200000"/>
+              </a:lnSpc>
+            </a:pPr>
+            <a:r>
+              <a:rPr lang="en-US" sz="2000" dirty="0"/>
+              <a:t>More batch processing techniques</a:t>
+            </a:r>
+          </a:p>
+          <a:p>
+            <a:pPr>
+              <a:lnSpc>
+                <a:spcPct val="200000"/>
+              </a:lnSpc>
+            </a:pPr>
+            <a:r>
+              <a:rPr lang="en-US" sz="2000" dirty="0"/>
+              <a:t>Local models</a:t>
+            </a:r>
+          </a:p>
+          <a:p>
+            <a:pPr>
+              <a:lnSpc>
+                <a:spcPct val="200000"/>
+              </a:lnSpc>
+            </a:pPr>
+            <a:r>
+              <a:rPr lang="en-US" sz="2000" dirty="0"/>
+              <a:t>Streamlined deployment</a:t>
+            </a:r>
+          </a:p>
+          <a:p>
+            <a:pPr lvl="0">
+              <a:lnSpc>
+                <a:spcPct val="200000"/>
+              </a:lnSpc>
+            </a:pPr>
+            <a:r>
+              <a:rPr lang="en-US" sz="2000" dirty="0"/>
               <a:t>Release a finetuning library?</a:t>
             </a:r>
-            <a:endParaRPr dirty="0"/>
+          </a:p>
+          <a:p>
+            <a:pPr marL="0" lvl="0" indent="0">
+              <a:buNone/>
+            </a:pPr>
+            <a:endParaRPr lang="en-US" sz="2000" dirty="0"/>
           </a:p>
         </p:txBody>
       </p:sp>
@@ -3922,7 +5312,7 @@
         </p:blipFill>
         <p:spPr>
           <a:xfrm>
-            <a:off x="5707118" y="1200150"/>
+            <a:off x="7159422" y="1415303"/>
             <a:ext cx="1603578" cy="334854"/>
           </a:xfrm>
           <a:prstGeom prst="rect">
@@ -3943,7 +5333,7 @@
 </p:sld>
 </file>
 
-<file path=ppt/slides/slide12.xml><?xml version="1.0" encoding="utf-8"?>
+<file path=ppt/slides/slide19.xml><?xml version="1.0" encoding="utf-8"?>
 <p:sld xmlns:a="http://schemas.openxmlformats.org/drawingml/2006/main" xmlns:r="http://schemas.openxmlformats.org/officeDocument/2006/relationships" xmlns:p="http://schemas.openxmlformats.org/presentationml/2006/main">
   <p:cSld>
     <p:spTree>
@@ -3951,7 +5341,7 @@
         <p:cNvPr id="1" name="">
           <a:extLst>
             <a:ext uri="{FF2B5EF4-FFF2-40B4-BE49-F238E27FC236}">
-              <a16:creationId xmlns:a16="http://schemas.microsoft.com/office/drawing/2014/main" id="{4D1E170D-2AA2-FE45-22F9-3D2297181233}"/>
+              <a16:creationId xmlns:a16="http://schemas.microsoft.com/office/drawing/2014/main" id="{14684297-891C-B0B2-0B50-543EFBA620FF}"/>
             </a:ext>
           </a:extLst>
         </p:cNvPr>
@@ -3971,7 +5361,7 @@
           <p:cNvPr id="2" name="Title 1">
             <a:extLst>
               <a:ext uri="{FF2B5EF4-FFF2-40B4-BE49-F238E27FC236}">
-                <a16:creationId xmlns:a16="http://schemas.microsoft.com/office/drawing/2014/main" id="{6C6A98E6-55D7-0270-491A-2917858B5536}"/>
+                <a16:creationId xmlns:a16="http://schemas.microsoft.com/office/drawing/2014/main" id="{60EA5EBE-9FB2-75B8-3516-289AD7857DFC}"/>
               </a:ext>
             </a:extLst>
           </p:cNvPr>
@@ -3992,54 +5382,46 @@
             </a:pPr>
             <a:r>
               <a:rPr lang="en-US" dirty="0"/>
-              <a:t>Resources</a:t>
+              <a:t>Thanks!</a:t>
             </a:r>
             <a:endParaRPr dirty="0"/>
           </a:p>
         </p:txBody>
       </p:sp>
-      <p:sp>
-        <p:nvSpPr>
-          <p:cNvPr id="3" name="Content Placeholder 2">
-            <a:extLst>
-              <a:ext uri="{FF2B5EF4-FFF2-40B4-BE49-F238E27FC236}">
-                <a16:creationId xmlns:a16="http://schemas.microsoft.com/office/drawing/2014/main" id="{0CAD6554-DFF8-369D-242D-A6E06F80F84A}"/>
-              </a:ext>
-            </a:extLst>
-          </p:cNvPr>
-          <p:cNvSpPr>
-            <a:spLocks noGrp="1"/>
-          </p:cNvSpPr>
-          <p:nvPr>
-            <p:ph idx="1"/>
-          </p:nvPr>
-        </p:nvSpPr>
-        <p:spPr/>
-        <p:txBody>
-          <a:bodyPr/>
-          <a:lstStyle/>
-          <a:p>
-            <a:pPr lvl="0"/>
-            <a:r>
-              <a:rPr lang="en-US" dirty="0" err="1">
-                <a:hlinkClick r:id="rId2"/>
-              </a:rPr>
-              <a:t>Unsloth</a:t>
-            </a:r>
-            <a:r>
-              <a:rPr lang="en-US" dirty="0">
-                <a:hlinkClick r:id="rId2"/>
-              </a:rPr>
-              <a:t> Dataset Guide</a:t>
-            </a:r>
-            <a:endParaRPr dirty="0"/>
-          </a:p>
-        </p:txBody>
-      </p:sp>
+      <p:pic>
+        <p:nvPicPr>
+          <p:cNvPr id="6" name="Picture 5">
+            <a:extLst>
+              <a:ext uri="{FF2B5EF4-FFF2-40B4-BE49-F238E27FC236}">
+                <a16:creationId xmlns:a16="http://schemas.microsoft.com/office/drawing/2014/main" id="{74CD701F-8363-E27B-979D-E6BCE945CAAA}"/>
+              </a:ext>
+            </a:extLst>
+          </p:cNvPr>
+          <p:cNvPicPr>
+            <a:picLocks noChangeAspect="1"/>
+          </p:cNvPicPr>
+          <p:nvPr/>
+        </p:nvPicPr>
+        <p:blipFill>
+          <a:blip r:embed="rId2"/>
+          <a:stretch>
+            <a:fillRect/>
+          </a:stretch>
+        </p:blipFill>
+        <p:spPr>
+          <a:xfrm>
+            <a:off x="2725269" y="1506070"/>
+            <a:ext cx="3541059" cy="3541059"/>
+          </a:xfrm>
+          <a:prstGeom prst="rect">
+            <a:avLst/>
+          </a:prstGeom>
+        </p:spPr>
+      </p:pic>
     </p:spTree>
     <p:extLst>
       <p:ext uri="{BB962C8B-B14F-4D97-AF65-F5344CB8AC3E}">
-        <p14:creationId xmlns:p14="http://schemas.microsoft.com/office/powerpoint/2010/main" val="1541732246"/>
+        <p14:creationId xmlns:p14="http://schemas.microsoft.com/office/powerpoint/2010/main" val="2525549775"/>
       </p:ext>
     </p:extLst>
   </p:cSld>
@@ -4104,8 +5486,8 @@
         </p:nvSpPr>
         <p:spPr>
           <a:xfrm>
-            <a:off x="3618052" y="3037398"/>
-            <a:ext cx="1907895" cy="369332"/>
+            <a:off x="794363" y="2965680"/>
+            <a:ext cx="7555273" cy="369332"/>
           </a:xfrm>
           <a:prstGeom prst="rect">
             <a:avLst/>
@@ -4120,11 +5502,41 @@
           <a:p>
             <a:r>
               <a:rPr lang="en-ES" dirty="0"/>
-              <a:t>Gabriel Bénédict</a:t>
-            </a:r>
-          </a:p>
-        </p:txBody>
-      </p:sp>
+              <a:t>Gabriel Bénédict, Matthew Butler, Naved Merchant, Eetu Salama-Laine</a:t>
+            </a:r>
+          </a:p>
+        </p:txBody>
+      </p:sp>
+      <p:pic>
+        <p:nvPicPr>
+          <p:cNvPr id="4" name="Picture 3">
+            <a:extLst>
+              <a:ext uri="{FF2B5EF4-FFF2-40B4-BE49-F238E27FC236}">
+                <a16:creationId xmlns:a16="http://schemas.microsoft.com/office/drawing/2014/main" id="{ECA8877F-57EE-8755-EEBE-07589FE95238}"/>
+              </a:ext>
+            </a:extLst>
+          </p:cNvPr>
+          <p:cNvPicPr>
+            <a:picLocks noChangeAspect="1"/>
+          </p:cNvPicPr>
+          <p:nvPr/>
+        </p:nvPicPr>
+        <p:blipFill>
+          <a:blip r:embed="rId2"/>
+          <a:stretch>
+            <a:fillRect/>
+          </a:stretch>
+        </p:blipFill>
+        <p:spPr>
+          <a:xfrm>
+            <a:off x="7700682" y="0"/>
+            <a:ext cx="1443318" cy="1443318"/>
+          </a:xfrm>
+          <a:prstGeom prst="rect">
+            <a:avLst/>
+          </a:prstGeom>
+        </p:spPr>
+      </p:pic>
     </p:spTree>
   </p:cSld>
   <p:clrMapOvr>
@@ -4188,31 +5600,31 @@
         </p:nvSpPr>
         <p:spPr>
           <a:xfrm>
-            <a:off x="3026229" y="1372427"/>
-            <a:ext cx="2545756" cy="272800"/>
+            <a:off x="2440651" y="1357043"/>
+            <a:ext cx="3716909" cy="272800"/>
           </a:xfrm>
         </p:spPr>
         <p:txBody>
           <a:bodyPr/>
           <a:lstStyle/>
           <a:p>
-            <a:pPr marL="0" lvl="0" indent="0">
+            <a:pPr marL="0" lvl="0" indent="0" algn="ctr">
               <a:buNone/>
             </a:pPr>
             <a:r>
-              <a:rPr lang="en-US" dirty="0"/>
+              <a:rPr lang="en-US" sz="2000" dirty="0"/>
               <a:t>AGI -&gt; Reasoning, planning, etc.</a:t>
             </a:r>
-            <a:endParaRPr dirty="0"/>
-          </a:p>
-        </p:txBody>
-      </p:sp>
-      <p:sp>
-        <p:nvSpPr>
-          <p:cNvPr id="6" name="Rectangle 5">
-            <a:extLst>
-              <a:ext uri="{FF2B5EF4-FFF2-40B4-BE49-F238E27FC236}">
-                <a16:creationId xmlns:a16="http://schemas.microsoft.com/office/drawing/2014/main" id="{12133FCE-E172-6770-9DB3-A7496C0371DE}"/>
+            <a:endParaRPr sz="2000" dirty="0"/>
+          </a:p>
+        </p:txBody>
+      </p:sp>
+      <p:sp>
+        <p:nvSpPr>
+          <p:cNvPr id="8" name="Rectangle 7">
+            <a:extLst>
+              <a:ext uri="{FF2B5EF4-FFF2-40B4-BE49-F238E27FC236}">
+                <a16:creationId xmlns:a16="http://schemas.microsoft.com/office/drawing/2014/main" id="{FC8A849A-9563-8D8A-91B7-B9616F99B82D}"/>
               </a:ext>
             </a:extLst>
           </p:cNvPr>
@@ -4221,7 +5633,7 @@
         </p:nvSpPr>
         <p:spPr>
           <a:xfrm>
-            <a:off x="2572031" y="2243207"/>
+            <a:off x="3983796" y="887127"/>
             <a:ext cx="630621" cy="342337"/>
           </a:xfrm>
           <a:prstGeom prst="rect">
@@ -4251,17 +5663,152 @@
             <a:pPr algn="ctr"/>
             <a:r>
               <a:rPr lang="en-ES" dirty="0"/>
-              <a:t>LLM</a:t>
-            </a:r>
-          </a:p>
-        </p:txBody>
-      </p:sp>
-      <p:sp>
-        <p:nvSpPr>
-          <p:cNvPr id="7" name="Rectangle 6">
-            <a:extLst>
-              <a:ext uri="{FF2B5EF4-FFF2-40B4-BE49-F238E27FC236}">
-                <a16:creationId xmlns:a16="http://schemas.microsoft.com/office/drawing/2014/main" id="{3851EBC3-87E0-4277-A8F7-967728E3F3AC}"/>
+              <a:t>LM</a:t>
+            </a:r>
+          </a:p>
+        </p:txBody>
+      </p:sp>
+      <p:sp>
+        <p:nvSpPr>
+          <p:cNvPr id="13" name="TextBox 12">
+            <a:extLst>
+              <a:ext uri="{FF2B5EF4-FFF2-40B4-BE49-F238E27FC236}">
+                <a16:creationId xmlns:a16="http://schemas.microsoft.com/office/drawing/2014/main" id="{3BEDCEE1-9D9B-6787-C30C-003744DC3C42}"/>
+              </a:ext>
+            </a:extLst>
+          </p:cNvPr>
+          <p:cNvSpPr txBox="1"/>
+          <p:nvPr/>
+        </p:nvSpPr>
+        <p:spPr>
+          <a:xfrm>
+            <a:off x="4631888" y="757473"/>
+            <a:ext cx="630621" cy="523220"/>
+          </a:xfrm>
+          <a:prstGeom prst="rect">
+            <a:avLst/>
+          </a:prstGeom>
+          <a:noFill/>
+        </p:spPr>
+        <p:txBody>
+          <a:bodyPr wrap="square" rtlCol="0">
+            <a:spAutoFit/>
+          </a:bodyPr>
+          <a:lstStyle/>
+          <a:p>
+            <a:r>
+              <a:rPr lang="en-ES" sz="2800" dirty="0"/>
+              <a:t>💬</a:t>
+            </a:r>
+          </a:p>
+        </p:txBody>
+      </p:sp>
+    </p:spTree>
+  </p:cSld>
+  <p:clrMapOvr>
+    <a:masterClrMapping/>
+  </p:clrMapOvr>
+</p:sld>
+</file>
+
+<file path=ppt/slides/slide4.xml><?xml version="1.0" encoding="utf-8"?>
+<p:sld xmlns:a="http://schemas.openxmlformats.org/drawingml/2006/main" xmlns:r="http://schemas.openxmlformats.org/officeDocument/2006/relationships" xmlns:p="http://schemas.openxmlformats.org/presentationml/2006/main">
+  <p:cSld>
+    <p:spTree>
+      <p:nvGrpSpPr>
+        <p:cNvPr id="1" name="">
+          <a:extLst>
+            <a:ext uri="{FF2B5EF4-FFF2-40B4-BE49-F238E27FC236}">
+              <a16:creationId xmlns:a16="http://schemas.microsoft.com/office/drawing/2014/main" id="{AE93E77F-85E7-6F7E-6CA4-13BB5269B20B}"/>
+            </a:ext>
+          </a:extLst>
+        </p:cNvPr>
+        <p:cNvGrpSpPr/>
+        <p:nvPr/>
+      </p:nvGrpSpPr>
+      <p:grpSpPr>
+        <a:xfrm>
+          <a:off x="0" y="0"/>
+          <a:ext cx="0" cy="0"/>
+          <a:chOff x="0" y="0"/>
+          <a:chExt cx="0" cy="0"/>
+        </a:xfrm>
+      </p:grpSpPr>
+      <p:sp>
+        <p:nvSpPr>
+          <p:cNvPr id="2" name="Title 1">
+            <a:extLst>
+              <a:ext uri="{FF2B5EF4-FFF2-40B4-BE49-F238E27FC236}">
+                <a16:creationId xmlns:a16="http://schemas.microsoft.com/office/drawing/2014/main" id="{BC4314D6-28F6-EFCB-9324-CAFF163DEF29}"/>
+              </a:ext>
+            </a:extLst>
+          </p:cNvPr>
+          <p:cNvSpPr>
+            <a:spLocks noGrp="1"/>
+          </p:cNvSpPr>
+          <p:nvPr>
+            <p:ph type="title"/>
+          </p:nvPr>
+        </p:nvSpPr>
+        <p:spPr/>
+        <p:txBody>
+          <a:bodyPr/>
+          <a:lstStyle/>
+          <a:p>
+            <a:pPr marL="0" lvl="0" indent="0">
+              <a:buNone/>
+            </a:pPr>
+            <a:r>
+              <a:rPr lang="en-US" dirty="0"/>
+              <a:t>Motivation</a:t>
+            </a:r>
+            <a:endParaRPr dirty="0"/>
+          </a:p>
+        </p:txBody>
+      </p:sp>
+      <p:sp>
+        <p:nvSpPr>
+          <p:cNvPr id="3" name="Content Placeholder 2">
+            <a:extLst>
+              <a:ext uri="{FF2B5EF4-FFF2-40B4-BE49-F238E27FC236}">
+                <a16:creationId xmlns:a16="http://schemas.microsoft.com/office/drawing/2014/main" id="{E49C3D7B-4A08-1D5E-6F36-DBC82CAC0C7E}"/>
+              </a:ext>
+            </a:extLst>
+          </p:cNvPr>
+          <p:cNvSpPr>
+            <a:spLocks noGrp="1"/>
+          </p:cNvSpPr>
+          <p:nvPr>
+            <p:ph idx="1"/>
+          </p:nvPr>
+        </p:nvSpPr>
+        <p:spPr>
+          <a:xfrm>
+            <a:off x="2440651" y="1357043"/>
+            <a:ext cx="3716909" cy="272800"/>
+          </a:xfrm>
+        </p:spPr>
+        <p:txBody>
+          <a:bodyPr/>
+          <a:lstStyle/>
+          <a:p>
+            <a:pPr marL="0" lvl="0" indent="0" algn="ctr">
+              <a:buNone/>
+            </a:pPr>
+            <a:r>
+              <a:rPr lang="en-US" sz="2000" dirty="0"/>
+              <a:t>AGI -&gt; Reasoning, planning, etc.</a:t>
+            </a:r>
+            <a:endParaRPr sz="2000" dirty="0"/>
+          </a:p>
+        </p:txBody>
+      </p:sp>
+      <p:sp>
+        <p:nvSpPr>
+          <p:cNvPr id="8" name="Rectangle 7">
+            <a:extLst>
+              <a:ext uri="{FF2B5EF4-FFF2-40B4-BE49-F238E27FC236}">
+                <a16:creationId xmlns:a16="http://schemas.microsoft.com/office/drawing/2014/main" id="{1741EC4E-B9D8-67D5-F979-38102784F601}"/>
               </a:ext>
             </a:extLst>
           </p:cNvPr>
@@ -4270,7 +5817,7 @@
         </p:nvSpPr>
         <p:spPr>
           <a:xfrm>
-            <a:off x="6112517" y="2229413"/>
+            <a:off x="3983796" y="887127"/>
             <a:ext cx="630621" cy="342337"/>
           </a:xfrm>
           <a:prstGeom prst="rect">
@@ -4300,17 +5847,255 @@
             <a:pPr algn="ctr"/>
             <a:r>
               <a:rPr lang="en-ES" dirty="0"/>
-              <a:t>SLM</a:t>
-            </a:r>
-          </a:p>
-        </p:txBody>
-      </p:sp>
-      <p:sp>
-        <p:nvSpPr>
-          <p:cNvPr id="8" name="Rectangle 7">
-            <a:extLst>
-              <a:ext uri="{FF2B5EF4-FFF2-40B4-BE49-F238E27FC236}">
-                <a16:creationId xmlns:a16="http://schemas.microsoft.com/office/drawing/2014/main" id="{FC8A849A-9563-8D8A-91B7-B9616F99B82D}"/>
+              <a:t>LM</a:t>
+            </a:r>
+          </a:p>
+        </p:txBody>
+      </p:sp>
+      <p:sp>
+        <p:nvSpPr>
+          <p:cNvPr id="13" name="TextBox 12">
+            <a:extLst>
+              <a:ext uri="{FF2B5EF4-FFF2-40B4-BE49-F238E27FC236}">
+                <a16:creationId xmlns:a16="http://schemas.microsoft.com/office/drawing/2014/main" id="{E5CB2B1E-2562-446C-9905-2B77C03B05F4}"/>
+              </a:ext>
+            </a:extLst>
+          </p:cNvPr>
+          <p:cNvSpPr txBox="1"/>
+          <p:nvPr/>
+        </p:nvSpPr>
+        <p:spPr>
+          <a:xfrm>
+            <a:off x="4631888" y="757473"/>
+            <a:ext cx="630621" cy="523220"/>
+          </a:xfrm>
+          <a:prstGeom prst="rect">
+            <a:avLst/>
+          </a:prstGeom>
+          <a:noFill/>
+        </p:spPr>
+        <p:txBody>
+          <a:bodyPr wrap="square" rtlCol="0">
+            <a:spAutoFit/>
+          </a:bodyPr>
+          <a:lstStyle/>
+          <a:p>
+            <a:r>
+              <a:rPr lang="en-ES" sz="2800" dirty="0"/>
+              <a:t>💬</a:t>
+            </a:r>
+          </a:p>
+        </p:txBody>
+      </p:sp>
+      <p:sp>
+        <p:nvSpPr>
+          <p:cNvPr id="4" name="Content Placeholder 2">
+            <a:extLst>
+              <a:ext uri="{FF2B5EF4-FFF2-40B4-BE49-F238E27FC236}">
+                <a16:creationId xmlns:a16="http://schemas.microsoft.com/office/drawing/2014/main" id="{4D68A0AA-85E4-9CE8-8FBD-21DBC5E1829C}"/>
+              </a:ext>
+            </a:extLst>
+          </p:cNvPr>
+          <p:cNvSpPr txBox="1">
+            <a:spLocks/>
+          </p:cNvSpPr>
+          <p:nvPr/>
+        </p:nvSpPr>
+        <p:spPr>
+          <a:xfrm>
+            <a:off x="240777" y="2730121"/>
+            <a:ext cx="4320172" cy="272800"/>
+          </a:xfrm>
+          <a:prstGeom prst="rect">
+            <a:avLst/>
+          </a:prstGeom>
+        </p:spPr>
+        <p:txBody>
+          <a:bodyPr vert="horz" lIns="0" tIns="0" rIns="0" bIns="0" rtlCol="0">
+            <a:noAutofit/>
+          </a:bodyPr>
+          <a:lstStyle>
+            <a:lvl1pPr marL="171450" indent="-171450" algn="l" defTabSz="685800" rtl="0" eaLnBrk="1" latinLnBrk="0" hangingPunct="1">
+              <a:lnSpc>
+                <a:spcPts val="1800"/>
+              </a:lnSpc>
+              <a:spcBef>
+                <a:spcPts val="900"/>
+              </a:spcBef>
+              <a:buFont typeface="Arial" panose="020B0604020202020204" pitchFamily="34" charset="0"/>
+              <a:buChar char="•"/>
+              <a:defRPr sz="1300" b="0" i="0" kern="1200">
+                <a:solidFill>
+                  <a:schemeClr val="tx1"/>
+                </a:solidFill>
+                <a:latin typeface="Amazon Ember" panose="020B0603020204020204" pitchFamily="34" charset="0"/>
+                <a:ea typeface="Amazon Ember" panose="020B0603020204020204" pitchFamily="34" charset="0"/>
+                <a:cs typeface="Amazon Ember" panose="020B0603020204020204" pitchFamily="34" charset="0"/>
+              </a:defRPr>
+            </a:lvl1pPr>
+            <a:lvl2pPr marL="514350" indent="-171450" algn="l" defTabSz="685800" rtl="0" eaLnBrk="1" latinLnBrk="0" hangingPunct="1">
+              <a:lnSpc>
+                <a:spcPts val="1500"/>
+              </a:lnSpc>
+              <a:spcBef>
+                <a:spcPts val="900"/>
+              </a:spcBef>
+              <a:buFont typeface="Arial" panose="020B0604020202020204" pitchFamily="34" charset="0"/>
+              <a:buChar char="•"/>
+              <a:defRPr sz="1000" b="0" i="0" kern="1200">
+                <a:solidFill>
+                  <a:schemeClr val="tx1"/>
+                </a:solidFill>
+                <a:latin typeface="Amazon Ember" panose="020B0603020204020204" pitchFamily="34" charset="0"/>
+                <a:ea typeface="Amazon Ember" panose="020B0603020204020204" pitchFamily="34" charset="0"/>
+                <a:cs typeface="Amazon Ember" panose="020B0603020204020204" pitchFamily="34" charset="0"/>
+              </a:defRPr>
+            </a:lvl2pPr>
+            <a:lvl3pPr marL="857250" indent="-171450" algn="l" defTabSz="685800" rtl="0" eaLnBrk="1" latinLnBrk="0" hangingPunct="1">
+              <a:lnSpc>
+                <a:spcPts val="1200"/>
+              </a:lnSpc>
+              <a:spcBef>
+                <a:spcPts val="900"/>
+              </a:spcBef>
+              <a:buFont typeface="Arial" panose="020B0604020202020204" pitchFamily="34" charset="0"/>
+              <a:buChar char="•"/>
+              <a:defRPr sz="800" b="0" i="0" kern="1200">
+                <a:solidFill>
+                  <a:schemeClr val="tx1"/>
+                </a:solidFill>
+                <a:latin typeface="Amazon Ember" panose="020B0603020204020204" pitchFamily="34" charset="0"/>
+                <a:ea typeface="Amazon Ember" panose="020B0603020204020204" pitchFamily="34" charset="0"/>
+                <a:cs typeface="Amazon Ember" panose="020B0603020204020204" pitchFamily="34" charset="0"/>
+              </a:defRPr>
+            </a:lvl3pPr>
+            <a:lvl4pPr marL="1200150" indent="-171450" algn="l" defTabSz="685800" rtl="0" eaLnBrk="1" latinLnBrk="0" hangingPunct="1">
+              <a:lnSpc>
+                <a:spcPts val="1200"/>
+              </a:lnSpc>
+              <a:spcBef>
+                <a:spcPts val="900"/>
+              </a:spcBef>
+              <a:buFont typeface="Arial" panose="020B0604020202020204" pitchFamily="34" charset="0"/>
+              <a:buChar char="•"/>
+              <a:defRPr sz="800" b="0" i="0" kern="1200">
+                <a:solidFill>
+                  <a:schemeClr val="tx1"/>
+                </a:solidFill>
+                <a:latin typeface="Amazon Ember" panose="020B0603020204020204" pitchFamily="34" charset="0"/>
+                <a:ea typeface="Amazon Ember" panose="020B0603020204020204" pitchFamily="34" charset="0"/>
+                <a:cs typeface="Amazon Ember" panose="020B0603020204020204" pitchFamily="34" charset="0"/>
+              </a:defRPr>
+            </a:lvl4pPr>
+            <a:lvl5pPr marL="1543050" indent="-171450" algn="l" defTabSz="685800" rtl="0" eaLnBrk="1" latinLnBrk="0" hangingPunct="1">
+              <a:lnSpc>
+                <a:spcPts val="1200"/>
+              </a:lnSpc>
+              <a:spcBef>
+                <a:spcPts val="900"/>
+              </a:spcBef>
+              <a:buFont typeface="Arial" panose="020B0604020202020204" pitchFamily="34" charset="0"/>
+              <a:buChar char="•"/>
+              <a:defRPr sz="800" b="0" i="0" kern="1200">
+                <a:solidFill>
+                  <a:schemeClr val="tx1"/>
+                </a:solidFill>
+                <a:latin typeface="Amazon Ember" panose="020B0603020204020204" pitchFamily="34" charset="0"/>
+                <a:ea typeface="Amazon Ember" panose="020B0603020204020204" pitchFamily="34" charset="0"/>
+                <a:cs typeface="Amazon Ember" panose="020B0603020204020204" pitchFamily="34" charset="0"/>
+              </a:defRPr>
+            </a:lvl5pPr>
+            <a:lvl6pPr marL="1885950" indent="-171450" algn="l" defTabSz="685800" rtl="0" eaLnBrk="1" latinLnBrk="0" hangingPunct="1">
+              <a:lnSpc>
+                <a:spcPct val="90000"/>
+              </a:lnSpc>
+              <a:spcBef>
+                <a:spcPts val="375"/>
+              </a:spcBef>
+              <a:buFont typeface="Arial" panose="020B0604020202020204" pitchFamily="34" charset="0"/>
+              <a:buChar char="•"/>
+              <a:defRPr sz="1350" kern="1200">
+                <a:solidFill>
+                  <a:schemeClr val="tx1"/>
+                </a:solidFill>
+                <a:latin typeface="+mn-lt"/>
+                <a:ea typeface="+mn-ea"/>
+                <a:cs typeface="+mn-cs"/>
+              </a:defRPr>
+            </a:lvl6pPr>
+            <a:lvl7pPr marL="2228850" indent="-171450" algn="l" defTabSz="685800" rtl="0" eaLnBrk="1" latinLnBrk="0" hangingPunct="1">
+              <a:lnSpc>
+                <a:spcPct val="90000"/>
+              </a:lnSpc>
+              <a:spcBef>
+                <a:spcPts val="375"/>
+              </a:spcBef>
+              <a:buFont typeface="Arial" panose="020B0604020202020204" pitchFamily="34" charset="0"/>
+              <a:buChar char="•"/>
+              <a:defRPr sz="1350" kern="1200">
+                <a:solidFill>
+                  <a:schemeClr val="tx1"/>
+                </a:solidFill>
+                <a:latin typeface="+mn-lt"/>
+                <a:ea typeface="+mn-ea"/>
+                <a:cs typeface="+mn-cs"/>
+              </a:defRPr>
+            </a:lvl7pPr>
+            <a:lvl8pPr marL="2571750" indent="-171450" algn="l" defTabSz="685800" rtl="0" eaLnBrk="1" latinLnBrk="0" hangingPunct="1">
+              <a:lnSpc>
+                <a:spcPct val="90000"/>
+              </a:lnSpc>
+              <a:spcBef>
+                <a:spcPts val="375"/>
+              </a:spcBef>
+              <a:buFont typeface="Arial" panose="020B0604020202020204" pitchFamily="34" charset="0"/>
+              <a:buChar char="•"/>
+              <a:defRPr sz="1350" kern="1200">
+                <a:solidFill>
+                  <a:schemeClr val="tx1"/>
+                </a:solidFill>
+                <a:latin typeface="+mn-lt"/>
+                <a:ea typeface="+mn-ea"/>
+                <a:cs typeface="+mn-cs"/>
+              </a:defRPr>
+            </a:lvl8pPr>
+            <a:lvl9pPr marL="2914650" indent="-171450" algn="l" defTabSz="685800" rtl="0" eaLnBrk="1" latinLnBrk="0" hangingPunct="1">
+              <a:lnSpc>
+                <a:spcPct val="90000"/>
+              </a:lnSpc>
+              <a:spcBef>
+                <a:spcPts val="375"/>
+              </a:spcBef>
+              <a:buFont typeface="Arial" panose="020B0604020202020204" pitchFamily="34" charset="0"/>
+              <a:buChar char="•"/>
+              <a:defRPr sz="1350" kern="1200">
+                <a:solidFill>
+                  <a:schemeClr val="tx1"/>
+                </a:solidFill>
+                <a:latin typeface="+mn-lt"/>
+                <a:ea typeface="+mn-ea"/>
+                <a:cs typeface="+mn-cs"/>
+              </a:defRPr>
+            </a:lvl9pPr>
+          </a:lstStyle>
+          <a:p>
+            <a:pPr marL="0" indent="0" algn="ctr">
+              <a:buFont typeface="Arial" panose="020B0604020202020204" pitchFamily="34" charset="0"/>
+              <a:buNone/>
+            </a:pPr>
+            <a:r>
+              <a:rPr lang="en-US" sz="2000" dirty="0"/>
+              <a:t>AGI -&gt; Reasoning, planning, etc.</a:t>
+            </a:r>
+          </a:p>
+        </p:txBody>
+      </p:sp>
+      <p:sp>
+        <p:nvSpPr>
+          <p:cNvPr id="5" name="Rectangle 4">
+            <a:extLst>
+              <a:ext uri="{FF2B5EF4-FFF2-40B4-BE49-F238E27FC236}">
+                <a16:creationId xmlns:a16="http://schemas.microsoft.com/office/drawing/2014/main" id="{50B4057A-8409-CB88-9F34-D2741FCDD366}"/>
               </a:ext>
             </a:extLst>
           </p:cNvPr>
@@ -4319,7 +6104,7 @@
         </p:nvSpPr>
         <p:spPr>
           <a:xfrm>
-            <a:off x="3979291" y="1015878"/>
+            <a:off x="1765923" y="2204375"/>
             <a:ext cx="630621" cy="342337"/>
           </a:xfrm>
           <a:prstGeom prst="rect">
@@ -4349,6 +6134,294 @@
             <a:pPr algn="ctr"/>
             <a:r>
               <a:rPr lang="en-ES" dirty="0"/>
+              <a:t>LLM</a:t>
+            </a:r>
+          </a:p>
+        </p:txBody>
+      </p:sp>
+      <p:sp>
+        <p:nvSpPr>
+          <p:cNvPr id="11" name="TextBox 10">
+            <a:extLst>
+              <a:ext uri="{FF2B5EF4-FFF2-40B4-BE49-F238E27FC236}">
+                <a16:creationId xmlns:a16="http://schemas.microsoft.com/office/drawing/2014/main" id="{E27CCF3C-2D4B-866C-B006-1E3A48A56050}"/>
+              </a:ext>
+            </a:extLst>
+          </p:cNvPr>
+          <p:cNvSpPr txBox="1"/>
+          <p:nvPr/>
+        </p:nvSpPr>
+        <p:spPr>
+          <a:xfrm>
+            <a:off x="2396544" y="2166135"/>
+            <a:ext cx="543739" cy="523220"/>
+          </a:xfrm>
+          <a:prstGeom prst="rect">
+            <a:avLst/>
+          </a:prstGeom>
+          <a:noFill/>
+        </p:spPr>
+        <p:txBody>
+          <a:bodyPr wrap="none" rtlCol="0">
+            <a:spAutoFit/>
+          </a:bodyPr>
+          <a:lstStyle/>
+          <a:p>
+            <a:r>
+              <a:rPr lang="en-ES" sz="2800" dirty="0"/>
+              <a:t>🏢</a:t>
+            </a:r>
+            <a:endParaRPr lang="en-ES" dirty="0"/>
+          </a:p>
+        </p:txBody>
+      </p:sp>
+    </p:spTree>
+    <p:extLst>
+      <p:ext uri="{BB962C8B-B14F-4D97-AF65-F5344CB8AC3E}">
+        <p14:creationId xmlns:p14="http://schemas.microsoft.com/office/powerpoint/2010/main" val="2019916379"/>
+      </p:ext>
+    </p:extLst>
+  </p:cSld>
+  <p:clrMapOvr>
+    <a:masterClrMapping/>
+  </p:clrMapOvr>
+</p:sld>
+</file>
+
+<file path=ppt/slides/slide5.xml><?xml version="1.0" encoding="utf-8"?>
+<p:sld xmlns:a="http://schemas.openxmlformats.org/drawingml/2006/main" xmlns:r="http://schemas.openxmlformats.org/officeDocument/2006/relationships" xmlns:p="http://schemas.openxmlformats.org/presentationml/2006/main">
+  <p:cSld>
+    <p:spTree>
+      <p:nvGrpSpPr>
+        <p:cNvPr id="1" name="">
+          <a:extLst>
+            <a:ext uri="{FF2B5EF4-FFF2-40B4-BE49-F238E27FC236}">
+              <a16:creationId xmlns:a16="http://schemas.microsoft.com/office/drawing/2014/main" id="{FCA038A2-4A8D-6FEB-9470-6932496C5B4E}"/>
+            </a:ext>
+          </a:extLst>
+        </p:cNvPr>
+        <p:cNvGrpSpPr/>
+        <p:nvPr/>
+      </p:nvGrpSpPr>
+      <p:grpSpPr>
+        <a:xfrm>
+          <a:off x="0" y="0"/>
+          <a:ext cx="0" cy="0"/>
+          <a:chOff x="0" y="0"/>
+          <a:chExt cx="0" cy="0"/>
+        </a:xfrm>
+      </p:grpSpPr>
+      <p:sp>
+        <p:nvSpPr>
+          <p:cNvPr id="2" name="Title 1">
+            <a:extLst>
+              <a:ext uri="{FF2B5EF4-FFF2-40B4-BE49-F238E27FC236}">
+                <a16:creationId xmlns:a16="http://schemas.microsoft.com/office/drawing/2014/main" id="{ED76EEC9-DD3E-E3FB-83D2-6A46996CDA3F}"/>
+              </a:ext>
+            </a:extLst>
+          </p:cNvPr>
+          <p:cNvSpPr>
+            <a:spLocks noGrp="1"/>
+          </p:cNvSpPr>
+          <p:nvPr>
+            <p:ph type="title"/>
+          </p:nvPr>
+        </p:nvSpPr>
+        <p:spPr/>
+        <p:txBody>
+          <a:bodyPr/>
+          <a:lstStyle/>
+          <a:p>
+            <a:pPr marL="0" lvl="0" indent="0">
+              <a:buNone/>
+            </a:pPr>
+            <a:r>
+              <a:rPr lang="en-US" dirty="0"/>
+              <a:t>Motivation</a:t>
+            </a:r>
+            <a:endParaRPr dirty="0"/>
+          </a:p>
+        </p:txBody>
+      </p:sp>
+      <p:sp>
+        <p:nvSpPr>
+          <p:cNvPr id="3" name="Content Placeholder 2">
+            <a:extLst>
+              <a:ext uri="{FF2B5EF4-FFF2-40B4-BE49-F238E27FC236}">
+                <a16:creationId xmlns:a16="http://schemas.microsoft.com/office/drawing/2014/main" id="{6BE8D7EC-3744-4413-95F1-F68C5637A8D5}"/>
+              </a:ext>
+            </a:extLst>
+          </p:cNvPr>
+          <p:cNvSpPr>
+            <a:spLocks noGrp="1"/>
+          </p:cNvSpPr>
+          <p:nvPr>
+            <p:ph idx="1"/>
+          </p:nvPr>
+        </p:nvSpPr>
+        <p:spPr>
+          <a:xfrm>
+            <a:off x="2440651" y="1357043"/>
+            <a:ext cx="3716909" cy="272800"/>
+          </a:xfrm>
+        </p:spPr>
+        <p:txBody>
+          <a:bodyPr/>
+          <a:lstStyle/>
+          <a:p>
+            <a:pPr marL="0" lvl="0" indent="0" algn="ctr">
+              <a:buNone/>
+            </a:pPr>
+            <a:r>
+              <a:rPr lang="en-US" sz="2000" dirty="0"/>
+              <a:t>AGI -&gt; Reasoning, planning, etc.</a:t>
+            </a:r>
+            <a:endParaRPr sz="2000" dirty="0"/>
+          </a:p>
+        </p:txBody>
+      </p:sp>
+      <p:sp>
+        <p:nvSpPr>
+          <p:cNvPr id="6" name="Rectangle 5">
+            <a:extLst>
+              <a:ext uri="{FF2B5EF4-FFF2-40B4-BE49-F238E27FC236}">
+                <a16:creationId xmlns:a16="http://schemas.microsoft.com/office/drawing/2014/main" id="{EB9E3D8F-D3AE-97B0-3889-338510D13099}"/>
+              </a:ext>
+            </a:extLst>
+          </p:cNvPr>
+          <p:cNvSpPr/>
+          <p:nvPr/>
+        </p:nvSpPr>
+        <p:spPr>
+          <a:xfrm>
+            <a:off x="1765923" y="2204375"/>
+            <a:ext cx="630621" cy="342337"/>
+          </a:xfrm>
+          <a:prstGeom prst="rect">
+            <a:avLst/>
+          </a:prstGeom>
+        </p:spPr>
+        <p:style>
+          <a:lnRef idx="2">
+            <a:schemeClr val="accent1">
+              <a:shade val="15000"/>
+            </a:schemeClr>
+          </a:lnRef>
+          <a:fillRef idx="1">
+            <a:schemeClr val="accent1"/>
+          </a:fillRef>
+          <a:effectRef idx="0">
+            <a:schemeClr val="accent1"/>
+          </a:effectRef>
+          <a:fontRef idx="minor">
+            <a:schemeClr val="lt1"/>
+          </a:fontRef>
+        </p:style>
+        <p:txBody>
+          <a:bodyPr rtlCol="0" anchor="ctr"/>
+          <a:lstStyle/>
+          <a:p>
+            <a:pPr algn="ctr"/>
+            <a:r>
+              <a:rPr lang="en-ES" dirty="0"/>
+              <a:t>LLM</a:t>
+            </a:r>
+          </a:p>
+        </p:txBody>
+      </p:sp>
+      <p:sp>
+        <p:nvSpPr>
+          <p:cNvPr id="7" name="Rectangle 6">
+            <a:extLst>
+              <a:ext uri="{FF2B5EF4-FFF2-40B4-BE49-F238E27FC236}">
+                <a16:creationId xmlns:a16="http://schemas.microsoft.com/office/drawing/2014/main" id="{511F793B-302E-13B3-6656-45B7F763E300}"/>
+              </a:ext>
+            </a:extLst>
+          </p:cNvPr>
+          <p:cNvSpPr/>
+          <p:nvPr/>
+        </p:nvSpPr>
+        <p:spPr>
+          <a:xfrm>
+            <a:off x="6112517" y="2229413"/>
+            <a:ext cx="630621" cy="342337"/>
+          </a:xfrm>
+          <a:prstGeom prst="rect">
+            <a:avLst/>
+          </a:prstGeom>
+        </p:spPr>
+        <p:style>
+          <a:lnRef idx="2">
+            <a:schemeClr val="accent1">
+              <a:shade val="15000"/>
+            </a:schemeClr>
+          </a:lnRef>
+          <a:fillRef idx="1">
+            <a:schemeClr val="accent1"/>
+          </a:fillRef>
+          <a:effectRef idx="0">
+            <a:schemeClr val="accent1"/>
+          </a:effectRef>
+          <a:fontRef idx="minor">
+            <a:schemeClr val="lt1"/>
+          </a:fontRef>
+        </p:style>
+        <p:txBody>
+          <a:bodyPr rtlCol="0" anchor="ctr"/>
+          <a:lstStyle/>
+          <a:p>
+            <a:pPr algn="ctr"/>
+            <a:r>
+              <a:rPr lang="en-ES" dirty="0"/>
+              <a:t>SLM</a:t>
+            </a:r>
+          </a:p>
+        </p:txBody>
+      </p:sp>
+      <p:sp>
+        <p:nvSpPr>
+          <p:cNvPr id="8" name="Rectangle 7">
+            <a:extLst>
+              <a:ext uri="{FF2B5EF4-FFF2-40B4-BE49-F238E27FC236}">
+                <a16:creationId xmlns:a16="http://schemas.microsoft.com/office/drawing/2014/main" id="{3DFB5D8E-628A-D3B9-2ED9-CD61EFC41255}"/>
+              </a:ext>
+            </a:extLst>
+          </p:cNvPr>
+          <p:cNvSpPr/>
+          <p:nvPr/>
+        </p:nvSpPr>
+        <p:spPr>
+          <a:xfrm>
+            <a:off x="3983796" y="887127"/>
+            <a:ext cx="630621" cy="342337"/>
+          </a:xfrm>
+          <a:prstGeom prst="rect">
+            <a:avLst/>
+          </a:prstGeom>
+        </p:spPr>
+        <p:style>
+          <a:lnRef idx="2">
+            <a:schemeClr val="accent1">
+              <a:shade val="15000"/>
+            </a:schemeClr>
+          </a:lnRef>
+          <a:fillRef idx="1">
+            <a:schemeClr val="accent1"/>
+          </a:fillRef>
+          <a:effectRef idx="0">
+            <a:schemeClr val="accent1"/>
+          </a:effectRef>
+          <a:fontRef idx="minor">
+            <a:schemeClr val="lt1"/>
+          </a:fontRef>
+        </p:style>
+        <p:txBody>
+          <a:bodyPr rtlCol="0" anchor="ctr"/>
+          <a:lstStyle/>
+          <a:p>
+            <a:pPr algn="ctr"/>
+            <a:r>
+              <a:rPr lang="en-ES" dirty="0"/>
               <a:t>LM</a:t>
             </a:r>
           </a:p>
@@ -4359,7 +6432,7 @@
           <p:cNvPr id="9" name="Content Placeholder 2">
             <a:extLst>
               <a:ext uri="{FF2B5EF4-FFF2-40B4-BE49-F238E27FC236}">
-                <a16:creationId xmlns:a16="http://schemas.microsoft.com/office/drawing/2014/main" id="{5B991248-5870-8E62-BC09-B2BA610173BF}"/>
+                <a16:creationId xmlns:a16="http://schemas.microsoft.com/office/drawing/2014/main" id="{594194E9-9ADE-3ADA-60CD-9DD3232230E2}"/>
               </a:ext>
             </a:extLst>
           </p:cNvPr>
@@ -4370,8 +6443,8 @@
         </p:nvSpPr>
         <p:spPr>
           <a:xfrm>
-            <a:off x="1614463" y="2594142"/>
-            <a:ext cx="2545756" cy="272800"/>
+            <a:off x="240777" y="2730121"/>
+            <a:ext cx="4320172" cy="272800"/>
           </a:xfrm>
           <a:prstGeom prst="rect">
             <a:avLst/>
@@ -4546,12 +6619,12 @@
             </a:lvl9pPr>
           </a:lstStyle>
           <a:p>
-            <a:pPr marL="0" indent="0">
+            <a:pPr marL="0" indent="0" algn="ctr">
               <a:buFont typeface="Arial" panose="020B0604020202020204" pitchFamily="34" charset="0"/>
               <a:buNone/>
             </a:pPr>
             <a:r>
-              <a:rPr lang="en-US" dirty="0"/>
+              <a:rPr lang="en-US" sz="2000" dirty="0"/>
               <a:t>AGI -&gt; Reasoning, planning, etc.</a:t>
             </a:r>
           </a:p>
@@ -4562,7 +6635,7 @@
           <p:cNvPr id="10" name="Content Placeholder 2">
             <a:extLst>
               <a:ext uri="{FF2B5EF4-FFF2-40B4-BE49-F238E27FC236}">
-                <a16:creationId xmlns:a16="http://schemas.microsoft.com/office/drawing/2014/main" id="{98F50AEC-E1B1-8222-F9EA-644BBCDCAFF2}"/>
+                <a16:creationId xmlns:a16="http://schemas.microsoft.com/office/drawing/2014/main" id="{94F2C553-2227-E9ED-1BD4-077ABE8C8F49}"/>
               </a:ext>
             </a:extLst>
           </p:cNvPr>
@@ -4573,8 +6646,8 @@
         </p:nvSpPr>
         <p:spPr>
           <a:xfrm>
-            <a:off x="5154949" y="2594142"/>
-            <a:ext cx="2545756" cy="272800"/>
+            <a:off x="4560949" y="2725266"/>
+            <a:ext cx="3791827" cy="272800"/>
           </a:xfrm>
           <a:prstGeom prst="rect">
             <a:avLst/>
@@ -4749,12 +6822,12 @@
             </a:lvl9pPr>
           </a:lstStyle>
           <a:p>
-            <a:pPr marL="0" indent="0">
+            <a:pPr marL="0" indent="0" algn="ctr">
               <a:buFont typeface="Arial" panose="020B0604020202020204" pitchFamily="34" charset="0"/>
               <a:buNone/>
             </a:pPr>
             <a:r>
-              <a:rPr lang="en-US" strike="sngStrike" dirty="0"/>
+              <a:rPr lang="en-US" sz="2000" strike="sngStrike" dirty="0"/>
               <a:t>AGI -&gt; Reasoning, planning, etc.</a:t>
             </a:r>
           </a:p>
@@ -4762,10 +6835,10 @@
       </p:sp>
       <p:sp>
         <p:nvSpPr>
-          <p:cNvPr id="12" name="TextBox 11">
-            <a:extLst>
-              <a:ext uri="{FF2B5EF4-FFF2-40B4-BE49-F238E27FC236}">
-                <a16:creationId xmlns:a16="http://schemas.microsoft.com/office/drawing/2014/main" id="{AE84B2D6-4B9F-4844-121A-B59D7A3926ED}"/>
+          <p:cNvPr id="13" name="TextBox 12">
+            <a:extLst>
+              <a:ext uri="{FF2B5EF4-FFF2-40B4-BE49-F238E27FC236}">
+                <a16:creationId xmlns:a16="http://schemas.microsoft.com/office/drawing/2014/main" id="{DA6278B0-D020-E26C-8ED5-3876721BAE80}"/>
               </a:ext>
             </a:extLst>
           </p:cNvPr>
@@ -4774,8 +6847,880 @@
         </p:nvSpPr>
         <p:spPr>
           <a:xfrm>
-            <a:off x="4141827" y="3092359"/>
-            <a:ext cx="4572000" cy="540917"/>
+            <a:off x="4631888" y="757473"/>
+            <a:ext cx="630621" cy="523220"/>
+          </a:xfrm>
+          <a:prstGeom prst="rect">
+            <a:avLst/>
+          </a:prstGeom>
+          <a:noFill/>
+        </p:spPr>
+        <p:txBody>
+          <a:bodyPr wrap="square" rtlCol="0">
+            <a:spAutoFit/>
+          </a:bodyPr>
+          <a:lstStyle/>
+          <a:p>
+            <a:r>
+              <a:rPr lang="en-ES" sz="2800" dirty="0"/>
+              <a:t>💬</a:t>
+            </a:r>
+          </a:p>
+        </p:txBody>
+      </p:sp>
+      <p:sp>
+        <p:nvSpPr>
+          <p:cNvPr id="14" name="TextBox 13">
+            <a:extLst>
+              <a:ext uri="{FF2B5EF4-FFF2-40B4-BE49-F238E27FC236}">
+                <a16:creationId xmlns:a16="http://schemas.microsoft.com/office/drawing/2014/main" id="{14C36564-9733-29E7-A299-90F31B44A336}"/>
+              </a:ext>
+            </a:extLst>
+          </p:cNvPr>
+          <p:cNvSpPr txBox="1"/>
+          <p:nvPr/>
+        </p:nvSpPr>
+        <p:spPr>
+          <a:xfrm>
+            <a:off x="6743138" y="2206901"/>
+            <a:ext cx="726141" cy="523220"/>
+          </a:xfrm>
+          <a:prstGeom prst="rect">
+            <a:avLst/>
+          </a:prstGeom>
+          <a:noFill/>
+        </p:spPr>
+        <p:txBody>
+          <a:bodyPr wrap="square" rtlCol="0">
+            <a:spAutoFit/>
+          </a:bodyPr>
+          <a:lstStyle/>
+          <a:p>
+            <a:r>
+              <a:rPr lang="en-ES" sz="2800" dirty="0"/>
+              <a:t>📱</a:t>
+            </a:r>
+            <a:endParaRPr lang="en-ES" dirty="0"/>
+          </a:p>
+        </p:txBody>
+      </p:sp>
+      <p:sp>
+        <p:nvSpPr>
+          <p:cNvPr id="15" name="TextBox 14">
+            <a:extLst>
+              <a:ext uri="{FF2B5EF4-FFF2-40B4-BE49-F238E27FC236}">
+                <a16:creationId xmlns:a16="http://schemas.microsoft.com/office/drawing/2014/main" id="{3461DAAC-0F07-211E-CC69-89E7B7C17242}"/>
+              </a:ext>
+            </a:extLst>
+          </p:cNvPr>
+          <p:cNvSpPr txBox="1"/>
+          <p:nvPr/>
+        </p:nvSpPr>
+        <p:spPr>
+          <a:xfrm>
+            <a:off x="2396544" y="2166135"/>
+            <a:ext cx="543739" cy="523220"/>
+          </a:xfrm>
+          <a:prstGeom prst="rect">
+            <a:avLst/>
+          </a:prstGeom>
+          <a:noFill/>
+        </p:spPr>
+        <p:txBody>
+          <a:bodyPr wrap="none" rtlCol="0">
+            <a:spAutoFit/>
+          </a:bodyPr>
+          <a:lstStyle/>
+          <a:p>
+            <a:r>
+              <a:rPr lang="en-ES" sz="2800" dirty="0"/>
+              <a:t>🏢</a:t>
+            </a:r>
+            <a:endParaRPr lang="en-ES" dirty="0"/>
+          </a:p>
+        </p:txBody>
+      </p:sp>
+    </p:spTree>
+    <p:extLst>
+      <p:ext uri="{BB962C8B-B14F-4D97-AF65-F5344CB8AC3E}">
+        <p14:creationId xmlns:p14="http://schemas.microsoft.com/office/powerpoint/2010/main" val="248614906"/>
+      </p:ext>
+    </p:extLst>
+  </p:cSld>
+  <p:clrMapOvr>
+    <a:masterClrMapping/>
+  </p:clrMapOvr>
+</p:sld>
+</file>
+
+<file path=ppt/slides/slide6.xml><?xml version="1.0" encoding="utf-8"?>
+<p:sld xmlns:a="http://schemas.openxmlformats.org/drawingml/2006/main" xmlns:r="http://schemas.openxmlformats.org/officeDocument/2006/relationships" xmlns:p="http://schemas.openxmlformats.org/presentationml/2006/main">
+  <p:cSld>
+    <p:spTree>
+      <p:nvGrpSpPr>
+        <p:cNvPr id="1" name="">
+          <a:extLst>
+            <a:ext uri="{FF2B5EF4-FFF2-40B4-BE49-F238E27FC236}">
+              <a16:creationId xmlns:a16="http://schemas.microsoft.com/office/drawing/2014/main" id="{E1AE7254-A3DE-51DD-D175-F16353324B3B}"/>
+            </a:ext>
+          </a:extLst>
+        </p:cNvPr>
+        <p:cNvGrpSpPr/>
+        <p:nvPr/>
+      </p:nvGrpSpPr>
+      <p:grpSpPr>
+        <a:xfrm>
+          <a:off x="0" y="0"/>
+          <a:ext cx="0" cy="0"/>
+          <a:chOff x="0" y="0"/>
+          <a:chExt cx="0" cy="0"/>
+        </a:xfrm>
+      </p:grpSpPr>
+      <p:sp>
+        <p:nvSpPr>
+          <p:cNvPr id="2" name="Title 1">
+            <a:extLst>
+              <a:ext uri="{FF2B5EF4-FFF2-40B4-BE49-F238E27FC236}">
+                <a16:creationId xmlns:a16="http://schemas.microsoft.com/office/drawing/2014/main" id="{733434A1-D8CD-E530-75ED-3A8C748FEDD5}"/>
+              </a:ext>
+            </a:extLst>
+          </p:cNvPr>
+          <p:cNvSpPr>
+            <a:spLocks noGrp="1"/>
+          </p:cNvSpPr>
+          <p:nvPr>
+            <p:ph type="title"/>
+          </p:nvPr>
+        </p:nvSpPr>
+        <p:spPr/>
+        <p:txBody>
+          <a:bodyPr/>
+          <a:lstStyle/>
+          <a:p>
+            <a:pPr marL="0" lvl="0" indent="0">
+              <a:buNone/>
+            </a:pPr>
+            <a:r>
+              <a:rPr lang="en-US" dirty="0"/>
+              <a:t>Motivation</a:t>
+            </a:r>
+            <a:endParaRPr dirty="0"/>
+          </a:p>
+        </p:txBody>
+      </p:sp>
+      <p:sp>
+        <p:nvSpPr>
+          <p:cNvPr id="3" name="Content Placeholder 2">
+            <a:extLst>
+              <a:ext uri="{FF2B5EF4-FFF2-40B4-BE49-F238E27FC236}">
+                <a16:creationId xmlns:a16="http://schemas.microsoft.com/office/drawing/2014/main" id="{DC5D5AEF-B290-045C-5B9C-41C7E4F85E91}"/>
+              </a:ext>
+            </a:extLst>
+          </p:cNvPr>
+          <p:cNvSpPr>
+            <a:spLocks noGrp="1"/>
+          </p:cNvSpPr>
+          <p:nvPr>
+            <p:ph idx="1"/>
+          </p:nvPr>
+        </p:nvSpPr>
+        <p:spPr>
+          <a:xfrm>
+            <a:off x="2440651" y="1357043"/>
+            <a:ext cx="3716909" cy="272800"/>
+          </a:xfrm>
+        </p:spPr>
+        <p:txBody>
+          <a:bodyPr/>
+          <a:lstStyle/>
+          <a:p>
+            <a:pPr marL="0" lvl="0" indent="0" algn="ctr">
+              <a:buNone/>
+            </a:pPr>
+            <a:r>
+              <a:rPr lang="en-US" sz="2000" dirty="0"/>
+              <a:t>AGI -&gt; Reasoning, planning, etc.</a:t>
+            </a:r>
+            <a:endParaRPr sz="2000" dirty="0"/>
+          </a:p>
+        </p:txBody>
+      </p:sp>
+      <p:sp>
+        <p:nvSpPr>
+          <p:cNvPr id="8" name="Rectangle 7">
+            <a:extLst>
+              <a:ext uri="{FF2B5EF4-FFF2-40B4-BE49-F238E27FC236}">
+                <a16:creationId xmlns:a16="http://schemas.microsoft.com/office/drawing/2014/main" id="{2134FB42-D251-D419-D74D-E9E10B40E1BA}"/>
+              </a:ext>
+            </a:extLst>
+          </p:cNvPr>
+          <p:cNvSpPr/>
+          <p:nvPr/>
+        </p:nvSpPr>
+        <p:spPr>
+          <a:xfrm>
+            <a:off x="3983796" y="887127"/>
+            <a:ext cx="630621" cy="342337"/>
+          </a:xfrm>
+          <a:prstGeom prst="rect">
+            <a:avLst/>
+          </a:prstGeom>
+        </p:spPr>
+        <p:style>
+          <a:lnRef idx="2">
+            <a:schemeClr val="accent1">
+              <a:shade val="15000"/>
+            </a:schemeClr>
+          </a:lnRef>
+          <a:fillRef idx="1">
+            <a:schemeClr val="accent1"/>
+          </a:fillRef>
+          <a:effectRef idx="0">
+            <a:schemeClr val="accent1"/>
+          </a:effectRef>
+          <a:fontRef idx="minor">
+            <a:schemeClr val="lt1"/>
+          </a:fontRef>
+        </p:style>
+        <p:txBody>
+          <a:bodyPr rtlCol="0" anchor="ctr"/>
+          <a:lstStyle/>
+          <a:p>
+            <a:pPr algn="ctr"/>
+            <a:r>
+              <a:rPr lang="en-ES" dirty="0"/>
+              <a:t>LM</a:t>
+            </a:r>
+          </a:p>
+        </p:txBody>
+      </p:sp>
+      <p:sp>
+        <p:nvSpPr>
+          <p:cNvPr id="13" name="TextBox 12">
+            <a:extLst>
+              <a:ext uri="{FF2B5EF4-FFF2-40B4-BE49-F238E27FC236}">
+                <a16:creationId xmlns:a16="http://schemas.microsoft.com/office/drawing/2014/main" id="{87E05744-8682-115A-61A2-5D986179354C}"/>
+              </a:ext>
+            </a:extLst>
+          </p:cNvPr>
+          <p:cNvSpPr txBox="1"/>
+          <p:nvPr/>
+        </p:nvSpPr>
+        <p:spPr>
+          <a:xfrm>
+            <a:off x="4631888" y="757473"/>
+            <a:ext cx="630621" cy="523220"/>
+          </a:xfrm>
+          <a:prstGeom prst="rect">
+            <a:avLst/>
+          </a:prstGeom>
+          <a:noFill/>
+        </p:spPr>
+        <p:txBody>
+          <a:bodyPr wrap="square" rtlCol="0">
+            <a:spAutoFit/>
+          </a:bodyPr>
+          <a:lstStyle/>
+          <a:p>
+            <a:r>
+              <a:rPr lang="en-ES" sz="2800" dirty="0"/>
+              <a:t>💬</a:t>
+            </a:r>
+          </a:p>
+        </p:txBody>
+      </p:sp>
+      <p:sp>
+        <p:nvSpPr>
+          <p:cNvPr id="4" name="Rectangle 3">
+            <a:extLst>
+              <a:ext uri="{FF2B5EF4-FFF2-40B4-BE49-F238E27FC236}">
+                <a16:creationId xmlns:a16="http://schemas.microsoft.com/office/drawing/2014/main" id="{31C06E49-8B1F-A1E0-2C13-E4C495382BDB}"/>
+              </a:ext>
+            </a:extLst>
+          </p:cNvPr>
+          <p:cNvSpPr/>
+          <p:nvPr/>
+        </p:nvSpPr>
+        <p:spPr>
+          <a:xfrm>
+            <a:off x="1765923" y="2204375"/>
+            <a:ext cx="630621" cy="342337"/>
+          </a:xfrm>
+          <a:prstGeom prst="rect">
+            <a:avLst/>
+          </a:prstGeom>
+        </p:spPr>
+        <p:style>
+          <a:lnRef idx="2">
+            <a:schemeClr val="accent1">
+              <a:shade val="15000"/>
+            </a:schemeClr>
+          </a:lnRef>
+          <a:fillRef idx="1">
+            <a:schemeClr val="accent1"/>
+          </a:fillRef>
+          <a:effectRef idx="0">
+            <a:schemeClr val="accent1"/>
+          </a:effectRef>
+          <a:fontRef idx="minor">
+            <a:schemeClr val="lt1"/>
+          </a:fontRef>
+        </p:style>
+        <p:txBody>
+          <a:bodyPr rtlCol="0" anchor="ctr"/>
+          <a:lstStyle/>
+          <a:p>
+            <a:pPr algn="ctr"/>
+            <a:r>
+              <a:rPr lang="en-ES" dirty="0"/>
+              <a:t>LLM</a:t>
+            </a:r>
+          </a:p>
+        </p:txBody>
+      </p:sp>
+      <p:sp>
+        <p:nvSpPr>
+          <p:cNvPr id="5" name="Rectangle 4">
+            <a:extLst>
+              <a:ext uri="{FF2B5EF4-FFF2-40B4-BE49-F238E27FC236}">
+                <a16:creationId xmlns:a16="http://schemas.microsoft.com/office/drawing/2014/main" id="{28E7E5DA-E05E-29AB-6E4F-F94943DC9F4D}"/>
+              </a:ext>
+            </a:extLst>
+          </p:cNvPr>
+          <p:cNvSpPr/>
+          <p:nvPr/>
+        </p:nvSpPr>
+        <p:spPr>
+          <a:xfrm>
+            <a:off x="6112517" y="2229413"/>
+            <a:ext cx="630621" cy="342337"/>
+          </a:xfrm>
+          <a:prstGeom prst="rect">
+            <a:avLst/>
+          </a:prstGeom>
+        </p:spPr>
+        <p:style>
+          <a:lnRef idx="2">
+            <a:schemeClr val="accent1">
+              <a:shade val="15000"/>
+            </a:schemeClr>
+          </a:lnRef>
+          <a:fillRef idx="1">
+            <a:schemeClr val="accent1"/>
+          </a:fillRef>
+          <a:effectRef idx="0">
+            <a:schemeClr val="accent1"/>
+          </a:effectRef>
+          <a:fontRef idx="minor">
+            <a:schemeClr val="lt1"/>
+          </a:fontRef>
+        </p:style>
+        <p:txBody>
+          <a:bodyPr rtlCol="0" anchor="ctr"/>
+          <a:lstStyle/>
+          <a:p>
+            <a:pPr algn="ctr"/>
+            <a:r>
+              <a:rPr lang="en-ES" dirty="0"/>
+              <a:t>SLM</a:t>
+            </a:r>
+          </a:p>
+        </p:txBody>
+      </p:sp>
+      <p:sp>
+        <p:nvSpPr>
+          <p:cNvPr id="11" name="Content Placeholder 2">
+            <a:extLst>
+              <a:ext uri="{FF2B5EF4-FFF2-40B4-BE49-F238E27FC236}">
+                <a16:creationId xmlns:a16="http://schemas.microsoft.com/office/drawing/2014/main" id="{F856A22D-1805-7176-093B-66FA99D5C1E6}"/>
+              </a:ext>
+            </a:extLst>
+          </p:cNvPr>
+          <p:cNvSpPr txBox="1">
+            <a:spLocks/>
+          </p:cNvSpPr>
+          <p:nvPr/>
+        </p:nvSpPr>
+        <p:spPr>
+          <a:xfrm>
+            <a:off x="240777" y="2730121"/>
+            <a:ext cx="4320172" cy="272800"/>
+          </a:xfrm>
+          <a:prstGeom prst="rect">
+            <a:avLst/>
+          </a:prstGeom>
+        </p:spPr>
+        <p:txBody>
+          <a:bodyPr vert="horz" lIns="0" tIns="0" rIns="0" bIns="0" rtlCol="0">
+            <a:noAutofit/>
+          </a:bodyPr>
+          <a:lstStyle>
+            <a:lvl1pPr marL="171450" indent="-171450" algn="l" defTabSz="685800" rtl="0" eaLnBrk="1" latinLnBrk="0" hangingPunct="1">
+              <a:lnSpc>
+                <a:spcPts val="1800"/>
+              </a:lnSpc>
+              <a:spcBef>
+                <a:spcPts val="900"/>
+              </a:spcBef>
+              <a:buFont typeface="Arial" panose="020B0604020202020204" pitchFamily="34" charset="0"/>
+              <a:buChar char="•"/>
+              <a:defRPr sz="1300" b="0" i="0" kern="1200">
+                <a:solidFill>
+                  <a:schemeClr val="tx1"/>
+                </a:solidFill>
+                <a:latin typeface="Amazon Ember" panose="020B0603020204020204" pitchFamily="34" charset="0"/>
+                <a:ea typeface="Amazon Ember" panose="020B0603020204020204" pitchFamily="34" charset="0"/>
+                <a:cs typeface="Amazon Ember" panose="020B0603020204020204" pitchFamily="34" charset="0"/>
+              </a:defRPr>
+            </a:lvl1pPr>
+            <a:lvl2pPr marL="514350" indent="-171450" algn="l" defTabSz="685800" rtl="0" eaLnBrk="1" latinLnBrk="0" hangingPunct="1">
+              <a:lnSpc>
+                <a:spcPts val="1500"/>
+              </a:lnSpc>
+              <a:spcBef>
+                <a:spcPts val="900"/>
+              </a:spcBef>
+              <a:buFont typeface="Arial" panose="020B0604020202020204" pitchFamily="34" charset="0"/>
+              <a:buChar char="•"/>
+              <a:defRPr sz="1000" b="0" i="0" kern="1200">
+                <a:solidFill>
+                  <a:schemeClr val="tx1"/>
+                </a:solidFill>
+                <a:latin typeface="Amazon Ember" panose="020B0603020204020204" pitchFamily="34" charset="0"/>
+                <a:ea typeface="Amazon Ember" panose="020B0603020204020204" pitchFamily="34" charset="0"/>
+                <a:cs typeface="Amazon Ember" panose="020B0603020204020204" pitchFamily="34" charset="0"/>
+              </a:defRPr>
+            </a:lvl2pPr>
+            <a:lvl3pPr marL="857250" indent="-171450" algn="l" defTabSz="685800" rtl="0" eaLnBrk="1" latinLnBrk="0" hangingPunct="1">
+              <a:lnSpc>
+                <a:spcPts val="1200"/>
+              </a:lnSpc>
+              <a:spcBef>
+                <a:spcPts val="900"/>
+              </a:spcBef>
+              <a:buFont typeface="Arial" panose="020B0604020202020204" pitchFamily="34" charset="0"/>
+              <a:buChar char="•"/>
+              <a:defRPr sz="800" b="0" i="0" kern="1200">
+                <a:solidFill>
+                  <a:schemeClr val="tx1"/>
+                </a:solidFill>
+                <a:latin typeface="Amazon Ember" panose="020B0603020204020204" pitchFamily="34" charset="0"/>
+                <a:ea typeface="Amazon Ember" panose="020B0603020204020204" pitchFamily="34" charset="0"/>
+                <a:cs typeface="Amazon Ember" panose="020B0603020204020204" pitchFamily="34" charset="0"/>
+              </a:defRPr>
+            </a:lvl3pPr>
+            <a:lvl4pPr marL="1200150" indent="-171450" algn="l" defTabSz="685800" rtl="0" eaLnBrk="1" latinLnBrk="0" hangingPunct="1">
+              <a:lnSpc>
+                <a:spcPts val="1200"/>
+              </a:lnSpc>
+              <a:spcBef>
+                <a:spcPts val="900"/>
+              </a:spcBef>
+              <a:buFont typeface="Arial" panose="020B0604020202020204" pitchFamily="34" charset="0"/>
+              <a:buChar char="•"/>
+              <a:defRPr sz="800" b="0" i="0" kern="1200">
+                <a:solidFill>
+                  <a:schemeClr val="tx1"/>
+                </a:solidFill>
+                <a:latin typeface="Amazon Ember" panose="020B0603020204020204" pitchFamily="34" charset="0"/>
+                <a:ea typeface="Amazon Ember" panose="020B0603020204020204" pitchFamily="34" charset="0"/>
+                <a:cs typeface="Amazon Ember" panose="020B0603020204020204" pitchFamily="34" charset="0"/>
+              </a:defRPr>
+            </a:lvl4pPr>
+            <a:lvl5pPr marL="1543050" indent="-171450" algn="l" defTabSz="685800" rtl="0" eaLnBrk="1" latinLnBrk="0" hangingPunct="1">
+              <a:lnSpc>
+                <a:spcPts val="1200"/>
+              </a:lnSpc>
+              <a:spcBef>
+                <a:spcPts val="900"/>
+              </a:spcBef>
+              <a:buFont typeface="Arial" panose="020B0604020202020204" pitchFamily="34" charset="0"/>
+              <a:buChar char="•"/>
+              <a:defRPr sz="800" b="0" i="0" kern="1200">
+                <a:solidFill>
+                  <a:schemeClr val="tx1"/>
+                </a:solidFill>
+                <a:latin typeface="Amazon Ember" panose="020B0603020204020204" pitchFamily="34" charset="0"/>
+                <a:ea typeface="Amazon Ember" panose="020B0603020204020204" pitchFamily="34" charset="0"/>
+                <a:cs typeface="Amazon Ember" panose="020B0603020204020204" pitchFamily="34" charset="0"/>
+              </a:defRPr>
+            </a:lvl5pPr>
+            <a:lvl6pPr marL="1885950" indent="-171450" algn="l" defTabSz="685800" rtl="0" eaLnBrk="1" latinLnBrk="0" hangingPunct="1">
+              <a:lnSpc>
+                <a:spcPct val="90000"/>
+              </a:lnSpc>
+              <a:spcBef>
+                <a:spcPts val="375"/>
+              </a:spcBef>
+              <a:buFont typeface="Arial" panose="020B0604020202020204" pitchFamily="34" charset="0"/>
+              <a:buChar char="•"/>
+              <a:defRPr sz="1350" kern="1200">
+                <a:solidFill>
+                  <a:schemeClr val="tx1"/>
+                </a:solidFill>
+                <a:latin typeface="+mn-lt"/>
+                <a:ea typeface="+mn-ea"/>
+                <a:cs typeface="+mn-cs"/>
+              </a:defRPr>
+            </a:lvl6pPr>
+            <a:lvl7pPr marL="2228850" indent="-171450" algn="l" defTabSz="685800" rtl="0" eaLnBrk="1" latinLnBrk="0" hangingPunct="1">
+              <a:lnSpc>
+                <a:spcPct val="90000"/>
+              </a:lnSpc>
+              <a:spcBef>
+                <a:spcPts val="375"/>
+              </a:spcBef>
+              <a:buFont typeface="Arial" panose="020B0604020202020204" pitchFamily="34" charset="0"/>
+              <a:buChar char="•"/>
+              <a:defRPr sz="1350" kern="1200">
+                <a:solidFill>
+                  <a:schemeClr val="tx1"/>
+                </a:solidFill>
+                <a:latin typeface="+mn-lt"/>
+                <a:ea typeface="+mn-ea"/>
+                <a:cs typeface="+mn-cs"/>
+              </a:defRPr>
+            </a:lvl7pPr>
+            <a:lvl8pPr marL="2571750" indent="-171450" algn="l" defTabSz="685800" rtl="0" eaLnBrk="1" latinLnBrk="0" hangingPunct="1">
+              <a:lnSpc>
+                <a:spcPct val="90000"/>
+              </a:lnSpc>
+              <a:spcBef>
+                <a:spcPts val="375"/>
+              </a:spcBef>
+              <a:buFont typeface="Arial" panose="020B0604020202020204" pitchFamily="34" charset="0"/>
+              <a:buChar char="•"/>
+              <a:defRPr sz="1350" kern="1200">
+                <a:solidFill>
+                  <a:schemeClr val="tx1"/>
+                </a:solidFill>
+                <a:latin typeface="+mn-lt"/>
+                <a:ea typeface="+mn-ea"/>
+                <a:cs typeface="+mn-cs"/>
+              </a:defRPr>
+            </a:lvl8pPr>
+            <a:lvl9pPr marL="2914650" indent="-171450" algn="l" defTabSz="685800" rtl="0" eaLnBrk="1" latinLnBrk="0" hangingPunct="1">
+              <a:lnSpc>
+                <a:spcPct val="90000"/>
+              </a:lnSpc>
+              <a:spcBef>
+                <a:spcPts val="375"/>
+              </a:spcBef>
+              <a:buFont typeface="Arial" panose="020B0604020202020204" pitchFamily="34" charset="0"/>
+              <a:buChar char="•"/>
+              <a:defRPr sz="1350" kern="1200">
+                <a:solidFill>
+                  <a:schemeClr val="tx1"/>
+                </a:solidFill>
+                <a:latin typeface="+mn-lt"/>
+                <a:ea typeface="+mn-ea"/>
+                <a:cs typeface="+mn-cs"/>
+              </a:defRPr>
+            </a:lvl9pPr>
+          </a:lstStyle>
+          <a:p>
+            <a:pPr marL="0" indent="0" algn="ctr">
+              <a:buFont typeface="Arial" panose="020B0604020202020204" pitchFamily="34" charset="0"/>
+              <a:buNone/>
+            </a:pPr>
+            <a:r>
+              <a:rPr lang="en-US" sz="2000" dirty="0"/>
+              <a:t>AGI -&gt; Reasoning, planning, etc.</a:t>
+            </a:r>
+          </a:p>
+        </p:txBody>
+      </p:sp>
+      <p:sp>
+        <p:nvSpPr>
+          <p:cNvPr id="16" name="Content Placeholder 2">
+            <a:extLst>
+              <a:ext uri="{FF2B5EF4-FFF2-40B4-BE49-F238E27FC236}">
+                <a16:creationId xmlns:a16="http://schemas.microsoft.com/office/drawing/2014/main" id="{E32EC917-FE5B-8B43-B0E1-59CD9C3A5B25}"/>
+              </a:ext>
+            </a:extLst>
+          </p:cNvPr>
+          <p:cNvSpPr txBox="1">
+            <a:spLocks/>
+          </p:cNvSpPr>
+          <p:nvPr/>
+        </p:nvSpPr>
+        <p:spPr>
+          <a:xfrm>
+            <a:off x="4560949" y="2725266"/>
+            <a:ext cx="3791827" cy="272800"/>
+          </a:xfrm>
+          <a:prstGeom prst="rect">
+            <a:avLst/>
+          </a:prstGeom>
+        </p:spPr>
+        <p:txBody>
+          <a:bodyPr vert="horz" lIns="0" tIns="0" rIns="0" bIns="0" rtlCol="0">
+            <a:noAutofit/>
+          </a:bodyPr>
+          <a:lstStyle>
+            <a:lvl1pPr marL="171450" indent="-171450" algn="l" defTabSz="685800" rtl="0" eaLnBrk="1" latinLnBrk="0" hangingPunct="1">
+              <a:lnSpc>
+                <a:spcPts val="1800"/>
+              </a:lnSpc>
+              <a:spcBef>
+                <a:spcPts val="900"/>
+              </a:spcBef>
+              <a:buFont typeface="Arial" panose="020B0604020202020204" pitchFamily="34" charset="0"/>
+              <a:buChar char="•"/>
+              <a:defRPr sz="1300" b="0" i="0" kern="1200">
+                <a:solidFill>
+                  <a:schemeClr val="tx1"/>
+                </a:solidFill>
+                <a:latin typeface="Amazon Ember" panose="020B0603020204020204" pitchFamily="34" charset="0"/>
+                <a:ea typeface="Amazon Ember" panose="020B0603020204020204" pitchFamily="34" charset="0"/>
+                <a:cs typeface="Amazon Ember" panose="020B0603020204020204" pitchFamily="34" charset="0"/>
+              </a:defRPr>
+            </a:lvl1pPr>
+            <a:lvl2pPr marL="514350" indent="-171450" algn="l" defTabSz="685800" rtl="0" eaLnBrk="1" latinLnBrk="0" hangingPunct="1">
+              <a:lnSpc>
+                <a:spcPts val="1500"/>
+              </a:lnSpc>
+              <a:spcBef>
+                <a:spcPts val="900"/>
+              </a:spcBef>
+              <a:buFont typeface="Arial" panose="020B0604020202020204" pitchFamily="34" charset="0"/>
+              <a:buChar char="•"/>
+              <a:defRPr sz="1000" b="0" i="0" kern="1200">
+                <a:solidFill>
+                  <a:schemeClr val="tx1"/>
+                </a:solidFill>
+                <a:latin typeface="Amazon Ember" panose="020B0603020204020204" pitchFamily="34" charset="0"/>
+                <a:ea typeface="Amazon Ember" panose="020B0603020204020204" pitchFamily="34" charset="0"/>
+                <a:cs typeface="Amazon Ember" panose="020B0603020204020204" pitchFamily="34" charset="0"/>
+              </a:defRPr>
+            </a:lvl2pPr>
+            <a:lvl3pPr marL="857250" indent="-171450" algn="l" defTabSz="685800" rtl="0" eaLnBrk="1" latinLnBrk="0" hangingPunct="1">
+              <a:lnSpc>
+                <a:spcPts val="1200"/>
+              </a:lnSpc>
+              <a:spcBef>
+                <a:spcPts val="900"/>
+              </a:spcBef>
+              <a:buFont typeface="Arial" panose="020B0604020202020204" pitchFamily="34" charset="0"/>
+              <a:buChar char="•"/>
+              <a:defRPr sz="800" b="0" i="0" kern="1200">
+                <a:solidFill>
+                  <a:schemeClr val="tx1"/>
+                </a:solidFill>
+                <a:latin typeface="Amazon Ember" panose="020B0603020204020204" pitchFamily="34" charset="0"/>
+                <a:ea typeface="Amazon Ember" panose="020B0603020204020204" pitchFamily="34" charset="0"/>
+                <a:cs typeface="Amazon Ember" panose="020B0603020204020204" pitchFamily="34" charset="0"/>
+              </a:defRPr>
+            </a:lvl3pPr>
+            <a:lvl4pPr marL="1200150" indent="-171450" algn="l" defTabSz="685800" rtl="0" eaLnBrk="1" latinLnBrk="0" hangingPunct="1">
+              <a:lnSpc>
+                <a:spcPts val="1200"/>
+              </a:lnSpc>
+              <a:spcBef>
+                <a:spcPts val="900"/>
+              </a:spcBef>
+              <a:buFont typeface="Arial" panose="020B0604020202020204" pitchFamily="34" charset="0"/>
+              <a:buChar char="•"/>
+              <a:defRPr sz="800" b="0" i="0" kern="1200">
+                <a:solidFill>
+                  <a:schemeClr val="tx1"/>
+                </a:solidFill>
+                <a:latin typeface="Amazon Ember" panose="020B0603020204020204" pitchFamily="34" charset="0"/>
+                <a:ea typeface="Amazon Ember" panose="020B0603020204020204" pitchFamily="34" charset="0"/>
+                <a:cs typeface="Amazon Ember" panose="020B0603020204020204" pitchFamily="34" charset="0"/>
+              </a:defRPr>
+            </a:lvl4pPr>
+            <a:lvl5pPr marL="1543050" indent="-171450" algn="l" defTabSz="685800" rtl="0" eaLnBrk="1" latinLnBrk="0" hangingPunct="1">
+              <a:lnSpc>
+                <a:spcPts val="1200"/>
+              </a:lnSpc>
+              <a:spcBef>
+                <a:spcPts val="900"/>
+              </a:spcBef>
+              <a:buFont typeface="Arial" panose="020B0604020202020204" pitchFamily="34" charset="0"/>
+              <a:buChar char="•"/>
+              <a:defRPr sz="800" b="0" i="0" kern="1200">
+                <a:solidFill>
+                  <a:schemeClr val="tx1"/>
+                </a:solidFill>
+                <a:latin typeface="Amazon Ember" panose="020B0603020204020204" pitchFamily="34" charset="0"/>
+                <a:ea typeface="Amazon Ember" panose="020B0603020204020204" pitchFamily="34" charset="0"/>
+                <a:cs typeface="Amazon Ember" panose="020B0603020204020204" pitchFamily="34" charset="0"/>
+              </a:defRPr>
+            </a:lvl5pPr>
+            <a:lvl6pPr marL="1885950" indent="-171450" algn="l" defTabSz="685800" rtl="0" eaLnBrk="1" latinLnBrk="0" hangingPunct="1">
+              <a:lnSpc>
+                <a:spcPct val="90000"/>
+              </a:lnSpc>
+              <a:spcBef>
+                <a:spcPts val="375"/>
+              </a:spcBef>
+              <a:buFont typeface="Arial" panose="020B0604020202020204" pitchFamily="34" charset="0"/>
+              <a:buChar char="•"/>
+              <a:defRPr sz="1350" kern="1200">
+                <a:solidFill>
+                  <a:schemeClr val="tx1"/>
+                </a:solidFill>
+                <a:latin typeface="+mn-lt"/>
+                <a:ea typeface="+mn-ea"/>
+                <a:cs typeface="+mn-cs"/>
+              </a:defRPr>
+            </a:lvl6pPr>
+            <a:lvl7pPr marL="2228850" indent="-171450" algn="l" defTabSz="685800" rtl="0" eaLnBrk="1" latinLnBrk="0" hangingPunct="1">
+              <a:lnSpc>
+                <a:spcPct val="90000"/>
+              </a:lnSpc>
+              <a:spcBef>
+                <a:spcPts val="375"/>
+              </a:spcBef>
+              <a:buFont typeface="Arial" panose="020B0604020202020204" pitchFamily="34" charset="0"/>
+              <a:buChar char="•"/>
+              <a:defRPr sz="1350" kern="1200">
+                <a:solidFill>
+                  <a:schemeClr val="tx1"/>
+                </a:solidFill>
+                <a:latin typeface="+mn-lt"/>
+                <a:ea typeface="+mn-ea"/>
+                <a:cs typeface="+mn-cs"/>
+              </a:defRPr>
+            </a:lvl7pPr>
+            <a:lvl8pPr marL="2571750" indent="-171450" algn="l" defTabSz="685800" rtl="0" eaLnBrk="1" latinLnBrk="0" hangingPunct="1">
+              <a:lnSpc>
+                <a:spcPct val="90000"/>
+              </a:lnSpc>
+              <a:spcBef>
+                <a:spcPts val="375"/>
+              </a:spcBef>
+              <a:buFont typeface="Arial" panose="020B0604020202020204" pitchFamily="34" charset="0"/>
+              <a:buChar char="•"/>
+              <a:defRPr sz="1350" kern="1200">
+                <a:solidFill>
+                  <a:schemeClr val="tx1"/>
+                </a:solidFill>
+                <a:latin typeface="+mn-lt"/>
+                <a:ea typeface="+mn-ea"/>
+                <a:cs typeface="+mn-cs"/>
+              </a:defRPr>
+            </a:lvl8pPr>
+            <a:lvl9pPr marL="2914650" indent="-171450" algn="l" defTabSz="685800" rtl="0" eaLnBrk="1" latinLnBrk="0" hangingPunct="1">
+              <a:lnSpc>
+                <a:spcPct val="90000"/>
+              </a:lnSpc>
+              <a:spcBef>
+                <a:spcPts val="375"/>
+              </a:spcBef>
+              <a:buFont typeface="Arial" panose="020B0604020202020204" pitchFamily="34" charset="0"/>
+              <a:buChar char="•"/>
+              <a:defRPr sz="1350" kern="1200">
+                <a:solidFill>
+                  <a:schemeClr val="tx1"/>
+                </a:solidFill>
+                <a:latin typeface="+mn-lt"/>
+                <a:ea typeface="+mn-ea"/>
+                <a:cs typeface="+mn-cs"/>
+              </a:defRPr>
+            </a:lvl9pPr>
+          </a:lstStyle>
+          <a:p>
+            <a:pPr marL="0" indent="0" algn="ctr">
+              <a:buFont typeface="Arial" panose="020B0604020202020204" pitchFamily="34" charset="0"/>
+              <a:buNone/>
+            </a:pPr>
+            <a:r>
+              <a:rPr lang="en-US" sz="2000" strike="sngStrike" dirty="0"/>
+              <a:t>AGI -&gt; Reasoning, planning, etc.</a:t>
+            </a:r>
+          </a:p>
+        </p:txBody>
+      </p:sp>
+      <p:sp>
+        <p:nvSpPr>
+          <p:cNvPr id="17" name="TextBox 16">
+            <a:extLst>
+              <a:ext uri="{FF2B5EF4-FFF2-40B4-BE49-F238E27FC236}">
+                <a16:creationId xmlns:a16="http://schemas.microsoft.com/office/drawing/2014/main" id="{48EB52F9-29EE-035A-64EE-13AC8DEC6AEE}"/>
+              </a:ext>
+            </a:extLst>
+          </p:cNvPr>
+          <p:cNvSpPr txBox="1"/>
+          <p:nvPr/>
+        </p:nvSpPr>
+        <p:spPr>
+          <a:xfrm>
+            <a:off x="6743138" y="2206901"/>
+            <a:ext cx="726141" cy="523220"/>
+          </a:xfrm>
+          <a:prstGeom prst="rect">
+            <a:avLst/>
+          </a:prstGeom>
+          <a:noFill/>
+        </p:spPr>
+        <p:txBody>
+          <a:bodyPr wrap="square" rtlCol="0">
+            <a:spAutoFit/>
+          </a:bodyPr>
+          <a:lstStyle/>
+          <a:p>
+            <a:r>
+              <a:rPr lang="en-ES" sz="2800" dirty="0"/>
+              <a:t>📱</a:t>
+            </a:r>
+            <a:endParaRPr lang="en-ES" dirty="0"/>
+          </a:p>
+        </p:txBody>
+      </p:sp>
+      <p:sp>
+        <p:nvSpPr>
+          <p:cNvPr id="18" name="TextBox 17">
+            <a:extLst>
+              <a:ext uri="{FF2B5EF4-FFF2-40B4-BE49-F238E27FC236}">
+                <a16:creationId xmlns:a16="http://schemas.microsoft.com/office/drawing/2014/main" id="{1CEFDD92-E174-A7E2-5F89-8D94CFAB2CA3}"/>
+              </a:ext>
+            </a:extLst>
+          </p:cNvPr>
+          <p:cNvSpPr txBox="1"/>
+          <p:nvPr/>
+        </p:nvSpPr>
+        <p:spPr>
+          <a:xfrm>
+            <a:off x="2396544" y="2166135"/>
+            <a:ext cx="543739" cy="523220"/>
+          </a:xfrm>
+          <a:prstGeom prst="rect">
+            <a:avLst/>
+          </a:prstGeom>
+          <a:noFill/>
+        </p:spPr>
+        <p:txBody>
+          <a:bodyPr wrap="none" rtlCol="0">
+            <a:spAutoFit/>
+          </a:bodyPr>
+          <a:lstStyle/>
+          <a:p>
+            <a:r>
+              <a:rPr lang="en-ES" sz="2800" dirty="0"/>
+              <a:t>🏢</a:t>
+            </a:r>
+            <a:endParaRPr lang="en-ES" dirty="0"/>
+          </a:p>
+        </p:txBody>
+      </p:sp>
+      <p:sp>
+        <p:nvSpPr>
+          <p:cNvPr id="19" name="TextBox 18">
+            <a:extLst>
+              <a:ext uri="{FF2B5EF4-FFF2-40B4-BE49-F238E27FC236}">
+                <a16:creationId xmlns:a16="http://schemas.microsoft.com/office/drawing/2014/main" id="{05757D12-EFF1-728B-9E23-0017D909E662}"/>
+              </a:ext>
+            </a:extLst>
+          </p:cNvPr>
+          <p:cNvSpPr txBox="1"/>
+          <p:nvPr/>
+        </p:nvSpPr>
+        <p:spPr>
+          <a:xfrm>
+            <a:off x="4614417" y="3248486"/>
+            <a:ext cx="4572000" cy="1657722"/>
           </a:xfrm>
           <a:prstGeom prst="rect">
             <a:avLst/>
@@ -4910,507 +7855,43 @@
             </a:lvl9pPr>
           </a:lstStyle>
           <a:p>
-            <a:pPr algn="ctr"/>
-            <a:r>
-              <a:rPr lang="en-GB" dirty="0"/>
+            <a:pPr marL="342900" indent="-342900">
+              <a:buFont typeface="Arial" panose="020B0604020202020204" pitchFamily="34" charset="0"/>
+              <a:buChar char="•"/>
+            </a:pPr>
+            <a:r>
+              <a:rPr lang="en-GB" sz="2000" dirty="0"/>
               <a:t>industrial settings</a:t>
             </a:r>
           </a:p>
           <a:p>
-            <a:pPr algn="ctr"/>
-            <a:r>
-              <a:rPr lang="en-GB" dirty="0"/>
-              <a:t>tone change (e.g., funny, serious, professional)</a:t>
-            </a:r>
-          </a:p>
-          <a:p>
-            <a:pPr algn="ctr"/>
-            <a:r>
-              <a:rPr lang="en-GB" dirty="0"/>
+            <a:pPr marL="342900" indent="-342900">
+              <a:buFont typeface="Arial" panose="020B0604020202020204" pitchFamily="34" charset="0"/>
+              <a:buChar char="•"/>
+            </a:pPr>
+            <a:r>
+              <a:rPr lang="en-GB" sz="2000" dirty="0"/>
+              <a:t>Writing Assist: tone change (e.g., funny, serious, professional)</a:t>
+            </a:r>
+          </a:p>
+          <a:p>
+            <a:pPr marL="342900" indent="-342900">
+              <a:buFont typeface="Arial" panose="020B0604020202020204" pitchFamily="34" charset="0"/>
+              <a:buChar char="•"/>
+            </a:pPr>
+            <a:r>
+              <a:rPr lang="en-GB" sz="2000" dirty="0"/>
               <a:t>non-reasoning tasks</a:t>
             </a:r>
-            <a:endParaRPr lang="en-ES" dirty="0"/>
-          </a:p>
-        </p:txBody>
-      </p:sp>
-    </p:spTree>
-  </p:cSld>
-  <p:clrMapOvr>
-    <a:masterClrMapping/>
-  </p:clrMapOvr>
-</p:sld>
-</file>
-
-<file path=ppt/slides/slide4.xml><?xml version="1.0" encoding="utf-8"?>
-<p:sld xmlns:a="http://schemas.openxmlformats.org/drawingml/2006/main" xmlns:r="http://schemas.openxmlformats.org/officeDocument/2006/relationships" xmlns:p="http://schemas.openxmlformats.org/presentationml/2006/main">
-  <p:cSld>
-    <p:spTree>
-      <p:nvGrpSpPr>
-        <p:cNvPr id="1" name="">
-          <a:extLst>
-            <a:ext uri="{FF2B5EF4-FFF2-40B4-BE49-F238E27FC236}">
-              <a16:creationId xmlns:a16="http://schemas.microsoft.com/office/drawing/2014/main" id="{18D5EF4F-448E-38C5-15A9-A47761DC36BD}"/>
-            </a:ext>
-          </a:extLst>
-        </p:cNvPr>
-        <p:cNvGrpSpPr/>
-        <p:nvPr/>
-      </p:nvGrpSpPr>
-      <p:grpSpPr>
-        <a:xfrm>
-          <a:off x="0" y="0"/>
-          <a:ext cx="0" cy="0"/>
-          <a:chOff x="0" y="0"/>
-          <a:chExt cx="0" cy="0"/>
-        </a:xfrm>
-      </p:grpSpPr>
-      <p:sp>
-        <p:nvSpPr>
-          <p:cNvPr id="2" name="Title 1">
-            <a:extLst>
-              <a:ext uri="{FF2B5EF4-FFF2-40B4-BE49-F238E27FC236}">
-                <a16:creationId xmlns:a16="http://schemas.microsoft.com/office/drawing/2014/main" id="{BC05F065-AE8C-A528-EDE0-693F95B149BE}"/>
-              </a:ext>
-            </a:extLst>
-          </p:cNvPr>
-          <p:cNvSpPr>
-            <a:spLocks noGrp="1"/>
-          </p:cNvSpPr>
-          <p:nvPr>
-            <p:ph type="title"/>
-          </p:nvPr>
-        </p:nvSpPr>
-        <p:spPr/>
-        <p:txBody>
-          <a:bodyPr/>
-          <a:lstStyle/>
-          <a:p>
-            <a:pPr marL="0" lvl="0" indent="0">
-              <a:buNone/>
-            </a:pPr>
-            <a:r>
-              <a:rPr lang="en-US" dirty="0"/>
-              <a:t>What evaluation frameworks are out there already?</a:t>
-            </a:r>
-            <a:endParaRPr dirty="0"/>
-          </a:p>
-        </p:txBody>
-      </p:sp>
-      <p:pic>
-        <p:nvPicPr>
-          <p:cNvPr id="4" name="Picture 3">
-            <a:extLst>
-              <a:ext uri="{FF2B5EF4-FFF2-40B4-BE49-F238E27FC236}">
-                <a16:creationId xmlns:a16="http://schemas.microsoft.com/office/drawing/2014/main" id="{2EBC9060-5593-7550-628F-E965710B8BA3}"/>
-              </a:ext>
-            </a:extLst>
-          </p:cNvPr>
-          <p:cNvPicPr>
-            <a:picLocks noChangeAspect="1"/>
-          </p:cNvPicPr>
-          <p:nvPr/>
-        </p:nvPicPr>
-        <p:blipFill>
-          <a:blip r:embed="rId2"/>
-          <a:stretch>
-            <a:fillRect/>
-          </a:stretch>
-        </p:blipFill>
-        <p:spPr>
-          <a:xfrm>
-            <a:off x="6219987" y="1445924"/>
-            <a:ext cx="2059161" cy="2320776"/>
-          </a:xfrm>
-          <a:prstGeom prst="rect">
-            <a:avLst/>
-          </a:prstGeom>
-        </p:spPr>
-      </p:pic>
-      <p:pic>
-        <p:nvPicPr>
-          <p:cNvPr id="5" name="Picture 4">
-            <a:extLst>
-              <a:ext uri="{FF2B5EF4-FFF2-40B4-BE49-F238E27FC236}">
-                <a16:creationId xmlns:a16="http://schemas.microsoft.com/office/drawing/2014/main" id="{D612710C-57C3-A39A-B065-F6551D346DBF}"/>
-              </a:ext>
-            </a:extLst>
-          </p:cNvPr>
-          <p:cNvPicPr>
-            <a:picLocks noChangeAspect="1"/>
-          </p:cNvPicPr>
-          <p:nvPr/>
-        </p:nvPicPr>
-        <p:blipFill>
-          <a:blip r:embed="rId3"/>
-          <a:stretch>
-            <a:fillRect/>
-          </a:stretch>
-        </p:blipFill>
-        <p:spPr>
-          <a:xfrm>
-            <a:off x="6755909" y="3872404"/>
-            <a:ext cx="987316" cy="987316"/>
-          </a:xfrm>
-          <a:prstGeom prst="rect">
-            <a:avLst/>
-          </a:prstGeom>
-        </p:spPr>
-      </p:pic>
-      <p:pic>
-        <p:nvPicPr>
-          <p:cNvPr id="6" name="Graphic 5">
-            <a:extLst>
-              <a:ext uri="{FF2B5EF4-FFF2-40B4-BE49-F238E27FC236}">
-                <a16:creationId xmlns:a16="http://schemas.microsoft.com/office/drawing/2014/main" id="{4A05E3F3-1FC9-A3C2-1FC7-DBBCA30407E1}"/>
-              </a:ext>
-            </a:extLst>
-          </p:cNvPr>
-          <p:cNvPicPr>
-            <a:picLocks noChangeAspect="1"/>
-          </p:cNvPicPr>
-          <p:nvPr/>
-        </p:nvPicPr>
-        <p:blipFill>
-          <a:blip r:embed="rId4">
-            <a:extLst>
-              <a:ext uri="{96DAC541-7B7A-43D3-8B79-37D633B846F1}">
-                <asvg:svgBlip xmlns:asvg="http://schemas.microsoft.com/office/drawing/2016/SVG/main" r:embed="rId5"/>
-              </a:ext>
-            </a:extLst>
-          </a:blip>
-          <a:stretch>
-            <a:fillRect/>
-          </a:stretch>
-        </p:blipFill>
-        <p:spPr>
-          <a:xfrm>
-            <a:off x="6447778" y="1058218"/>
-            <a:ext cx="1603578" cy="334854"/>
-          </a:xfrm>
-          <a:prstGeom prst="rect">
-            <a:avLst/>
-          </a:prstGeom>
-        </p:spPr>
-      </p:pic>
-      <p:pic>
-        <p:nvPicPr>
-          <p:cNvPr id="7" name="Picture 6">
-            <a:extLst>
-              <a:ext uri="{FF2B5EF4-FFF2-40B4-BE49-F238E27FC236}">
-                <a16:creationId xmlns:a16="http://schemas.microsoft.com/office/drawing/2014/main" id="{7EB01F0B-4BCF-6619-D5C2-643142AE2C82}"/>
-              </a:ext>
-            </a:extLst>
-          </p:cNvPr>
-          <p:cNvPicPr>
-            <a:picLocks noChangeAspect="1"/>
-          </p:cNvPicPr>
-          <p:nvPr/>
-        </p:nvPicPr>
-        <p:blipFill>
-          <a:blip r:embed="rId6"/>
-          <a:stretch>
-            <a:fillRect/>
-          </a:stretch>
-        </p:blipFill>
-        <p:spPr>
-          <a:xfrm>
-            <a:off x="381000" y="1445924"/>
-            <a:ext cx="3115942" cy="304291"/>
-          </a:xfrm>
-          <a:prstGeom prst="rect">
-            <a:avLst/>
-          </a:prstGeom>
-        </p:spPr>
-      </p:pic>
-      <p:pic>
-        <p:nvPicPr>
-          <p:cNvPr id="9" name="Picture 8">
-            <a:extLst>
-              <a:ext uri="{FF2B5EF4-FFF2-40B4-BE49-F238E27FC236}">
-                <a16:creationId xmlns:a16="http://schemas.microsoft.com/office/drawing/2014/main" id="{E2C15A6F-9DD1-9EBF-340D-D9AF0D815144}"/>
-              </a:ext>
-            </a:extLst>
-          </p:cNvPr>
-          <p:cNvPicPr>
-            <a:picLocks noChangeAspect="1"/>
-          </p:cNvPicPr>
-          <p:nvPr/>
-        </p:nvPicPr>
-        <p:blipFill>
-          <a:blip r:embed="rId7"/>
-          <a:stretch>
-            <a:fillRect/>
-          </a:stretch>
-        </p:blipFill>
-        <p:spPr>
-          <a:xfrm>
-            <a:off x="381000" y="1024985"/>
-            <a:ext cx="1771681" cy="401320"/>
-          </a:xfrm>
-          <a:prstGeom prst="rect">
-            <a:avLst/>
-          </a:prstGeom>
-        </p:spPr>
-      </p:pic>
+          </a:p>
+        </p:txBody>
+      </p:sp>
     </p:spTree>
     <p:extLst>
       <p:ext uri="{BB962C8B-B14F-4D97-AF65-F5344CB8AC3E}">
-        <p14:creationId xmlns:p14="http://schemas.microsoft.com/office/powerpoint/2010/main" val="2366781714"/>
+        <p14:creationId xmlns:p14="http://schemas.microsoft.com/office/powerpoint/2010/main" val="1231946743"/>
       </p:ext>
     </p:extLst>
-  </p:cSld>
-  <p:clrMapOvr>
-    <a:masterClrMapping/>
-  </p:clrMapOvr>
-</p:sld>
-</file>
-
-<file path=ppt/slides/slide5.xml><?xml version="1.0" encoding="utf-8"?>
-<p:sld xmlns:a="http://schemas.openxmlformats.org/drawingml/2006/main" xmlns:r="http://schemas.openxmlformats.org/officeDocument/2006/relationships" xmlns:p="http://schemas.openxmlformats.org/presentationml/2006/main">
-  <p:cSld>
-    <p:spTree>
-      <p:nvGrpSpPr>
-        <p:cNvPr id="1" name=""/>
-        <p:cNvGrpSpPr/>
-        <p:nvPr/>
-      </p:nvGrpSpPr>
-      <p:grpSpPr>
-        <a:xfrm>
-          <a:off x="0" y="0"/>
-          <a:ext cx="0" cy="0"/>
-          <a:chOff x="0" y="0"/>
-          <a:chExt cx="0" cy="0"/>
-        </a:xfrm>
-      </p:grpSpPr>
-      <p:sp>
-        <p:nvSpPr>
-          <p:cNvPr id="2" name="Title 1"/>
-          <p:cNvSpPr>
-            <a:spLocks noGrp="1"/>
-          </p:cNvSpPr>
-          <p:nvPr>
-            <p:ph type="title"/>
-          </p:nvPr>
-        </p:nvSpPr>
-        <p:spPr/>
-        <p:txBody>
-          <a:bodyPr/>
-          <a:lstStyle/>
-          <a:p>
-            <a:pPr marL="0" lvl="0" indent="0">
-              <a:buNone/>
-            </a:pPr>
-            <a:r>
-              <a:rPr lang="en-US" dirty="0"/>
-              <a:t>The WRAVAL Pipeline</a:t>
-            </a:r>
-            <a:endParaRPr dirty="0"/>
-          </a:p>
-        </p:txBody>
-      </p:sp>
-      <p:sp>
-        <p:nvSpPr>
-          <p:cNvPr id="3" name="Content Placeholder 2"/>
-          <p:cNvSpPr>
-            <a:spLocks noGrp="1"/>
-          </p:cNvSpPr>
-          <p:nvPr>
-            <p:ph idx="1"/>
-          </p:nvPr>
-        </p:nvSpPr>
-        <p:spPr/>
-        <p:txBody>
-          <a:bodyPr/>
-          <a:lstStyle/>
-          <a:p>
-            <a:pPr lvl="0"/>
-            <a:r>
-              <a:rPr lang="en-US" dirty="0"/>
-              <a:t>Synthetic data generation</a:t>
-            </a:r>
-          </a:p>
-          <a:p>
-            <a:pPr lvl="0"/>
-            <a:r>
-              <a:rPr lang="en-US" dirty="0"/>
-              <a:t>Deploy </a:t>
-            </a:r>
-            <a:r>
-              <a:rPr lang="en-US" dirty="0" err="1"/>
-              <a:t>Sagemaker</a:t>
-            </a:r>
-            <a:r>
-              <a:rPr lang="en-US" dirty="0"/>
-              <a:t> endpoint</a:t>
-            </a:r>
-            <a:endParaRPr dirty="0"/>
-          </a:p>
-          <a:p>
-            <a:pPr lvl="0"/>
-            <a:r>
-              <a:rPr lang="en-US" dirty="0"/>
-              <a:t>Inference [Bedrock / </a:t>
-            </a:r>
-            <a:r>
-              <a:rPr lang="en-US" dirty="0" err="1"/>
-              <a:t>Sagemaker</a:t>
-            </a:r>
-            <a:r>
-              <a:rPr lang="en-US" dirty="0"/>
-              <a:t> endpoint]</a:t>
-            </a:r>
-          </a:p>
-          <a:p>
-            <a:pPr lvl="0"/>
-            <a:r>
-              <a:rPr lang="en-US" dirty="0"/>
-              <a:t>LLM-as-a-judge</a:t>
-            </a:r>
-          </a:p>
-          <a:p>
-            <a:pPr lvl="0"/>
-            <a:r>
-              <a:rPr lang="en-US" dirty="0"/>
-              <a:t>Human-as-a-judge [</a:t>
-            </a:r>
-            <a:r>
-              <a:rPr lang="en-US" dirty="0" err="1"/>
-              <a:t>Mturk</a:t>
-            </a:r>
-            <a:r>
-              <a:rPr lang="en-US" dirty="0"/>
-              <a:t> / colleagues]</a:t>
-            </a:r>
-            <a:endParaRPr dirty="0"/>
-          </a:p>
-        </p:txBody>
-      </p:sp>
-      <p:pic>
-        <p:nvPicPr>
-          <p:cNvPr id="5" name="Picture 4">
-            <a:extLst>
-              <a:ext uri="{FF2B5EF4-FFF2-40B4-BE49-F238E27FC236}">
-                <a16:creationId xmlns:a16="http://schemas.microsoft.com/office/drawing/2014/main" id="{B9BB61B3-6436-4648-D921-72C9D7077D81}"/>
-              </a:ext>
-            </a:extLst>
-          </p:cNvPr>
-          <p:cNvPicPr>
-            <a:picLocks noChangeAspect="1"/>
-          </p:cNvPicPr>
-          <p:nvPr/>
-        </p:nvPicPr>
-        <p:blipFill>
-          <a:blip r:embed="rId2"/>
-          <a:stretch>
-            <a:fillRect/>
-          </a:stretch>
-        </p:blipFill>
-        <p:spPr>
-          <a:xfrm>
-            <a:off x="4914900" y="949657"/>
-            <a:ext cx="2788921" cy="1876530"/>
-          </a:xfrm>
-          <a:prstGeom prst="rect">
-            <a:avLst/>
-          </a:prstGeom>
-        </p:spPr>
-      </p:pic>
-    </p:spTree>
-  </p:cSld>
-  <p:clrMapOvr>
-    <a:masterClrMapping/>
-  </p:clrMapOvr>
-</p:sld>
-</file>
-
-<file path=ppt/slides/slide6.xml><?xml version="1.0" encoding="utf-8"?>
-<p:sld xmlns:a="http://schemas.openxmlformats.org/drawingml/2006/main" xmlns:r="http://schemas.openxmlformats.org/officeDocument/2006/relationships" xmlns:p="http://schemas.openxmlformats.org/presentationml/2006/main">
-  <p:cSld>
-    <p:spTree>
-      <p:nvGrpSpPr>
-        <p:cNvPr id="1" name=""/>
-        <p:cNvGrpSpPr/>
-        <p:nvPr/>
-      </p:nvGrpSpPr>
-      <p:grpSpPr>
-        <a:xfrm>
-          <a:off x="0" y="0"/>
-          <a:ext cx="0" cy="0"/>
-          <a:chOff x="0" y="0"/>
-          <a:chExt cx="0" cy="0"/>
-        </a:xfrm>
-      </p:grpSpPr>
-      <p:sp>
-        <p:nvSpPr>
-          <p:cNvPr id="2" name="Title 1"/>
-          <p:cNvSpPr>
-            <a:spLocks noGrp="1"/>
-          </p:cNvSpPr>
-          <p:nvPr>
-            <p:ph type="title"/>
-          </p:nvPr>
-        </p:nvSpPr>
-        <p:spPr/>
-        <p:txBody>
-          <a:bodyPr/>
-          <a:lstStyle/>
-          <a:p>
-            <a:pPr marL="0" lvl="0" indent="0">
-              <a:buNone/>
-            </a:pPr>
-            <a:r>
-              <a:t>Evaluation Metrics</a:t>
-            </a:r>
-          </a:p>
-        </p:txBody>
-      </p:sp>
-      <p:sp>
-        <p:nvSpPr>
-          <p:cNvPr id="3" name="Content Placeholder 2"/>
-          <p:cNvSpPr>
-            <a:spLocks noGrp="1"/>
-          </p:cNvSpPr>
-          <p:nvPr>
-            <p:ph idx="1"/>
-          </p:nvPr>
-        </p:nvSpPr>
-        <p:spPr/>
-        <p:txBody>
-          <a:bodyPr/>
-          <a:lstStyle/>
-          <a:p>
-            <a:pPr lvl="0"/>
-            <a:r>
-              <a:t>Primary dimensions:</a:t>
-            </a:r>
-          </a:p>
-          <a:p>
-            <a:pPr lvl="1"/>
-            <a:r>
-              <a:t>Task completion</a:t>
-            </a:r>
-          </a:p>
-          <a:p>
-            <a:pPr lvl="1"/>
-            <a:r>
-              <a:t>Writing quality</a:t>
-            </a:r>
-          </a:p>
-          <a:p>
-            <a:pPr lvl="1"/>
-            <a:r>
-              <a:t>Contextual appropriateness</a:t>
-            </a:r>
-          </a:p>
-          <a:p>
-            <a:pPr lvl="1"/>
-            <a:r>
-              <a:t>Factual accuracy</a:t>
-            </a:r>
-          </a:p>
-        </p:txBody>
-      </p:sp>
-    </p:spTree>
   </p:cSld>
   <p:clrMapOvr>
     <a:masterClrMapping/>
@@ -5437,7 +7918,13 @@
       </p:grpSpPr>
       <p:sp>
         <p:nvSpPr>
-          <p:cNvPr id="2" name="Title 1"/>
+          <p:cNvPr id="2" name="Title 1">
+            <a:extLst>
+              <a:ext uri="{FF2B5EF4-FFF2-40B4-BE49-F238E27FC236}">
+                <a16:creationId xmlns:a16="http://schemas.microsoft.com/office/drawing/2014/main" id="{2D291DB8-DA1D-2D2D-885B-9F33ED9C26B9}"/>
+              </a:ext>
+            </a:extLst>
+          </p:cNvPr>
           <p:cNvSpPr>
             <a:spLocks noGrp="1"/>
           </p:cNvSpPr>
@@ -5450,18 +7937,19 @@
           <a:bodyPr/>
           <a:lstStyle/>
           <a:p>
-            <a:pPr marL="0" lvl="0" indent="0">
-              <a:buNone/>
-            </a:pPr>
-            <a:r>
-              <a:t>Dataset Composition</a:t>
-            </a:r>
-          </a:p>
-        </p:txBody>
-      </p:sp>
-      <p:sp>
-        <p:nvSpPr>
-          <p:cNvPr id="3" name="Content Placeholder 2"/>
+            <a:endParaRPr lang="en-ES"/>
+          </a:p>
+        </p:txBody>
+      </p:sp>
+      <p:sp>
+        <p:nvSpPr>
+          <p:cNvPr id="3" name="Content Placeholder 2">
+            <a:extLst>
+              <a:ext uri="{FF2B5EF4-FFF2-40B4-BE49-F238E27FC236}">
+                <a16:creationId xmlns:a16="http://schemas.microsoft.com/office/drawing/2014/main" id="{ADA9523B-AA93-593F-66B7-44E56D440AA9}"/>
+              </a:ext>
+            </a:extLst>
+          </p:cNvPr>
           <p:cNvSpPr>
             <a:spLocks noGrp="1"/>
           </p:cNvSpPr>
@@ -5474,32 +7962,71 @@
           <a:bodyPr/>
           <a:lstStyle/>
           <a:p>
-            <a:pPr lvl="0"/>
-            <a:r>
-              <a:t>308 diverse writing scenarios</a:t>
-            </a:r>
-          </a:p>
-          <a:p>
-            <a:pPr lvl="0"/>
-            <a:r>
-              <a:t>Sourced from real user needs</a:t>
-            </a:r>
-          </a:p>
-          <a:p>
-            <a:pPr lvl="0"/>
-            <a:r>
-              <a:t>Balanced across different writing tasks</a:t>
-            </a:r>
-          </a:p>
-          <a:p>
-            <a:pPr lvl="0"/>
-            <a:r>
-              <a:t>Multiple domains and complexity levels</a:t>
-            </a:r>
-          </a:p>
-        </p:txBody>
-      </p:sp>
+            <a:endParaRPr lang="en-ES"/>
+          </a:p>
+        </p:txBody>
+      </p:sp>
+      <p:sp>
+        <p:nvSpPr>
+          <p:cNvPr id="4" name="Footer Placeholder 3">
+            <a:extLst>
+              <a:ext uri="{FF2B5EF4-FFF2-40B4-BE49-F238E27FC236}">
+                <a16:creationId xmlns:a16="http://schemas.microsoft.com/office/drawing/2014/main" id="{E4999972-69D4-C233-57AA-AB30D808C36F}"/>
+              </a:ext>
+            </a:extLst>
+          </p:cNvPr>
+          <p:cNvSpPr>
+            <a:spLocks noGrp="1"/>
+          </p:cNvSpPr>
+          <p:nvPr>
+            <p:ph type="ftr" sz="quarter" idx="11"/>
+          </p:nvPr>
+        </p:nvSpPr>
+        <p:spPr/>
+        <p:txBody>
+          <a:bodyPr/>
+          <a:lstStyle/>
+          <a:p>
+            <a:endParaRPr lang="en-US"/>
+          </a:p>
+        </p:txBody>
+      </p:sp>
+      <p:pic>
+        <p:nvPicPr>
+          <p:cNvPr id="6" name="Picture 5">
+            <a:extLst>
+              <a:ext uri="{FF2B5EF4-FFF2-40B4-BE49-F238E27FC236}">
+                <a16:creationId xmlns:a16="http://schemas.microsoft.com/office/drawing/2014/main" id="{304D6DCE-D76F-F060-9552-B4481B21BA50}"/>
+              </a:ext>
+            </a:extLst>
+          </p:cNvPr>
+          <p:cNvPicPr>
+            <a:picLocks noChangeAspect="1"/>
+          </p:cNvPicPr>
+          <p:nvPr/>
+        </p:nvPicPr>
+        <p:blipFill>
+          <a:blip r:embed="rId2"/>
+          <a:stretch>
+            <a:fillRect/>
+          </a:stretch>
+        </p:blipFill>
+        <p:spPr>
+          <a:xfrm>
+            <a:off x="-89578" y="0"/>
+            <a:ext cx="9323156" cy="5143499"/>
+          </a:xfrm>
+          <a:prstGeom prst="rect">
+            <a:avLst/>
+          </a:prstGeom>
+        </p:spPr>
+      </p:pic>
     </p:spTree>
+    <p:extLst>
+      <p:ext uri="{BB962C8B-B14F-4D97-AF65-F5344CB8AC3E}">
+        <p14:creationId xmlns:p14="http://schemas.microsoft.com/office/powerpoint/2010/main" val="2437370873"/>
+      </p:ext>
+    </p:extLst>
   </p:cSld>
   <p:clrMapOvr>
     <a:masterClrMapping/>
@@ -5512,7 +8039,13 @@
   <p:cSld>
     <p:spTree>
       <p:nvGrpSpPr>
-        <p:cNvPr id="1" name=""/>
+        <p:cNvPr id="1" name="">
+          <a:extLst>
+            <a:ext uri="{FF2B5EF4-FFF2-40B4-BE49-F238E27FC236}">
+              <a16:creationId xmlns:a16="http://schemas.microsoft.com/office/drawing/2014/main" id="{1A42667D-A453-2D33-F154-597BAA40B4B8}"/>
+            </a:ext>
+          </a:extLst>
+        </p:cNvPr>
         <p:cNvGrpSpPr/>
         <p:nvPr/>
       </p:nvGrpSpPr>
@@ -5526,7 +8059,13 @@
       </p:grpSpPr>
       <p:sp>
         <p:nvSpPr>
-          <p:cNvPr id="2" name="Title 1"/>
+          <p:cNvPr id="2" name="Title 1">
+            <a:extLst>
+              <a:ext uri="{FF2B5EF4-FFF2-40B4-BE49-F238E27FC236}">
+                <a16:creationId xmlns:a16="http://schemas.microsoft.com/office/drawing/2014/main" id="{10AAB737-DA1D-5012-35F0-98F0892FD2B3}"/>
+              </a:ext>
+            </a:extLst>
+          </p:cNvPr>
           <p:cNvSpPr>
             <a:spLocks noGrp="1"/>
           </p:cNvSpPr>
@@ -5543,56 +8082,239 @@
               <a:buNone/>
             </a:pPr>
             <a:r>
-              <a:t>Methodology</a:t>
-            </a:r>
-          </a:p>
-        </p:txBody>
-      </p:sp>
-      <p:sp>
-        <p:nvSpPr>
-          <p:cNvPr id="3" name="Content Placeholder 2"/>
-          <p:cNvSpPr>
-            <a:spLocks noGrp="1"/>
-          </p:cNvSpPr>
-          <p:nvPr>
-            <p:ph idx="1"/>
-          </p:nvPr>
-        </p:nvSpPr>
-        <p:spPr/>
-        <p:txBody>
-          <a:bodyPr/>
-          <a:lstStyle/>
-          <a:p>
-            <a:pPr lvl="0"/>
-            <a:r>
-              <a:t>Two-stage evaluation process</a:t>
-            </a:r>
-          </a:p>
-          <a:p>
-            <a:pPr lvl="0"/>
-            <a:r>
-              <a:t>Expert annotators</a:t>
-            </a:r>
-          </a:p>
-          <a:p>
-            <a:pPr lvl="0"/>
-            <a:r>
-              <a:t>Standardized scoring rubrics</a:t>
-            </a:r>
-          </a:p>
-          <a:p>
-            <a:pPr lvl="0"/>
-            <a:r>
-              <a:t>Inter-annotator agreement measures</a:t>
-            </a:r>
-          </a:p>
-        </p:txBody>
-      </p:sp>
+              <a:rPr lang="en-US" dirty="0"/>
+              <a:t>What evaluation metrics are out there already?</a:t>
+            </a:r>
+            <a:endParaRPr dirty="0"/>
+          </a:p>
+        </p:txBody>
+      </p:sp>
+      <p:pic>
+        <p:nvPicPr>
+          <p:cNvPr id="10" name="Picture 9">
+            <a:extLst>
+              <a:ext uri="{FF2B5EF4-FFF2-40B4-BE49-F238E27FC236}">
+                <a16:creationId xmlns:a16="http://schemas.microsoft.com/office/drawing/2014/main" id="{719E918A-4398-1FC2-4EAA-73BF7A494AAA}"/>
+              </a:ext>
+            </a:extLst>
+          </p:cNvPr>
+          <p:cNvPicPr>
+            <a:picLocks noChangeAspect="1"/>
+          </p:cNvPicPr>
+          <p:nvPr/>
+        </p:nvPicPr>
+        <p:blipFill>
+          <a:blip r:embed="rId2"/>
+          <a:stretch>
+            <a:fillRect/>
+          </a:stretch>
+        </p:blipFill>
+        <p:spPr>
+          <a:xfrm>
+            <a:off x="381000" y="1004047"/>
+            <a:ext cx="7805844" cy="3322876"/>
+          </a:xfrm>
+          <a:prstGeom prst="rect">
+            <a:avLst/>
+          </a:prstGeom>
+        </p:spPr>
+      </p:pic>
+      <p:grpSp>
+        <p:nvGrpSpPr>
+          <p:cNvPr id="12" name="Group 11">
+            <a:extLst>
+              <a:ext uri="{FF2B5EF4-FFF2-40B4-BE49-F238E27FC236}">
+                <a16:creationId xmlns:a16="http://schemas.microsoft.com/office/drawing/2014/main" id="{2DEF585E-B65A-8A84-7D8B-DFA03015B566}"/>
+              </a:ext>
+            </a:extLst>
+          </p:cNvPr>
+          <p:cNvGrpSpPr/>
+          <p:nvPr/>
+        </p:nvGrpSpPr>
+        <p:grpSpPr>
+          <a:xfrm>
+            <a:off x="4096871" y="3556997"/>
+            <a:ext cx="4840143" cy="1373924"/>
+            <a:chOff x="4827494" y="3764391"/>
+            <a:chExt cx="4109520" cy="1166529"/>
+          </a:xfrm>
+        </p:grpSpPr>
+        <p:pic>
+          <p:nvPicPr>
+            <p:cNvPr id="3" name="Picture 2">
+              <a:extLst>
+                <a:ext uri="{FF2B5EF4-FFF2-40B4-BE49-F238E27FC236}">
+                  <a16:creationId xmlns:a16="http://schemas.microsoft.com/office/drawing/2014/main" id="{7C4115FC-3BCF-A798-7BF4-77A527DF1A16}"/>
+                </a:ext>
+              </a:extLst>
+            </p:cNvPr>
+            <p:cNvPicPr>
+              <a:picLocks noChangeAspect="1"/>
+            </p:cNvPicPr>
+            <p:nvPr/>
+          </p:nvPicPr>
+          <p:blipFill>
+            <a:blip r:embed="rId3"/>
+            <a:stretch>
+              <a:fillRect/>
+            </a:stretch>
+          </p:blipFill>
+          <p:spPr>
+            <a:xfrm>
+              <a:off x="4827494" y="4529600"/>
+              <a:ext cx="4109520" cy="401320"/>
+            </a:xfrm>
+            <a:prstGeom prst="rect">
+              <a:avLst/>
+            </a:prstGeom>
+          </p:spPr>
+        </p:pic>
+        <p:pic>
+          <p:nvPicPr>
+            <p:cNvPr id="8" name="Picture 7">
+              <a:extLst>
+                <a:ext uri="{FF2B5EF4-FFF2-40B4-BE49-F238E27FC236}">
+                  <a16:creationId xmlns:a16="http://schemas.microsoft.com/office/drawing/2014/main" id="{80A39355-8A1A-CB9C-096D-D32F0648F995}"/>
+                </a:ext>
+              </a:extLst>
+            </p:cNvPr>
+            <p:cNvPicPr>
+              <a:picLocks noChangeAspect="1"/>
+            </p:cNvPicPr>
+            <p:nvPr/>
+          </p:nvPicPr>
+          <p:blipFill>
+            <a:blip r:embed="rId4"/>
+            <a:stretch>
+              <a:fillRect/>
+            </a:stretch>
+          </p:blipFill>
+          <p:spPr>
+            <a:xfrm>
+              <a:off x="4827494" y="3813579"/>
+              <a:ext cx="1771681" cy="401320"/>
+            </a:xfrm>
+            <a:prstGeom prst="rect">
+              <a:avLst/>
+            </a:prstGeom>
+          </p:spPr>
+        </p:pic>
+        <p:pic>
+          <p:nvPicPr>
+            <p:cNvPr id="11" name="Picture 10">
+              <a:extLst>
+                <a:ext uri="{FF2B5EF4-FFF2-40B4-BE49-F238E27FC236}">
+                  <a16:creationId xmlns:a16="http://schemas.microsoft.com/office/drawing/2014/main" id="{9AC84DF2-31AE-C827-EE70-0A82D7BD3025}"/>
+                </a:ext>
+              </a:extLst>
+            </p:cNvPr>
+            <p:cNvPicPr>
+              <a:picLocks noChangeAspect="1"/>
+            </p:cNvPicPr>
+            <p:nvPr/>
+          </p:nvPicPr>
+          <p:blipFill>
+            <a:blip r:embed="rId5"/>
+            <a:stretch>
+              <a:fillRect/>
+            </a:stretch>
+          </p:blipFill>
+          <p:spPr>
+            <a:xfrm>
+              <a:off x="8261568" y="3764391"/>
+              <a:ext cx="675445" cy="675445"/>
+            </a:xfrm>
+            <a:prstGeom prst="rect">
+              <a:avLst/>
+            </a:prstGeom>
+          </p:spPr>
+        </p:pic>
+      </p:grpSp>
     </p:spTree>
+    <p:extLst>
+      <p:ext uri="{BB962C8B-B14F-4D97-AF65-F5344CB8AC3E}">
+        <p14:creationId xmlns:p14="http://schemas.microsoft.com/office/powerpoint/2010/main" val="300119637"/>
+      </p:ext>
+    </p:extLst>
   </p:cSld>
   <p:clrMapOvr>
     <a:masterClrMapping/>
   </p:clrMapOvr>
+  <p:timing>
+    <p:tnLst>
+      <p:par>
+        <p:cTn id="1" dur="indefinite" restart="never" nodeType="tmRoot">
+          <p:childTnLst>
+            <p:seq concurrent="1" nextAc="seek">
+              <p:cTn id="2" dur="indefinite" nodeType="mainSeq">
+                <p:childTnLst>
+                  <p:par>
+                    <p:cTn id="3" fill="hold">
+                      <p:stCondLst>
+                        <p:cond delay="indefinite"/>
+                      </p:stCondLst>
+                      <p:childTnLst>
+                        <p:par>
+                          <p:cTn id="4" fill="hold">
+                            <p:stCondLst>
+                              <p:cond delay="0"/>
+                            </p:stCondLst>
+                            <p:childTnLst>
+                              <p:par>
+                                <p:cTn id="5" presetID="1" presetClass="entr" presetSubtype="0" fill="hold" nodeType="clickEffect">
+                                  <p:stCondLst>
+                                    <p:cond delay="0"/>
+                                  </p:stCondLst>
+                                  <p:childTnLst>
+                                    <p:set>
+                                      <p:cBhvr>
+                                        <p:cTn id="6" dur="1" fill="hold">
+                                          <p:stCondLst>
+                                            <p:cond delay="0"/>
+                                          </p:stCondLst>
+                                        </p:cTn>
+                                        <p:tgtEl>
+                                          <p:spTgt spid="12"/>
+                                        </p:tgtEl>
+                                        <p:attrNameLst>
+                                          <p:attrName>style.visibility</p:attrName>
+                                        </p:attrNameLst>
+                                      </p:cBhvr>
+                                      <p:to>
+                                        <p:strVal val="visible"/>
+                                      </p:to>
+                                    </p:set>
+                                  </p:childTnLst>
+                                </p:cTn>
+                              </p:par>
+                            </p:childTnLst>
+                          </p:cTn>
+                        </p:par>
+                      </p:childTnLst>
+                    </p:cTn>
+                  </p:par>
+                </p:childTnLst>
+              </p:cTn>
+              <p:prevCondLst>
+                <p:cond evt="onPrev" delay="0">
+                  <p:tgtEl>
+                    <p:sldTgt/>
+                  </p:tgtEl>
+                </p:cond>
+              </p:prevCondLst>
+              <p:nextCondLst>
+                <p:cond evt="onNext" delay="0">
+                  <p:tgtEl>
+                    <p:sldTgt/>
+                  </p:tgtEl>
+                </p:cond>
+              </p:nextCondLst>
+            </p:seq>
+          </p:childTnLst>
+        </p:cTn>
+      </p:par>
+    </p:tnLst>
+  </p:timing>
 </p:sld>
 </file>
 
@@ -5601,7 +8323,13 @@
   <p:cSld>
     <p:spTree>
       <p:nvGrpSpPr>
-        <p:cNvPr id="1" name=""/>
+        <p:cNvPr id="1" name="">
+          <a:extLst>
+            <a:ext uri="{FF2B5EF4-FFF2-40B4-BE49-F238E27FC236}">
+              <a16:creationId xmlns:a16="http://schemas.microsoft.com/office/drawing/2014/main" id="{18D5EF4F-448E-38C5-15A9-A47761DC36BD}"/>
+            </a:ext>
+          </a:extLst>
+        </p:cNvPr>
         <p:cNvGrpSpPr/>
         <p:nvPr/>
       </p:nvGrpSpPr>
@@ -5615,7 +8343,13 @@
       </p:grpSpPr>
       <p:sp>
         <p:nvSpPr>
-          <p:cNvPr id="2" name="Title 1"/>
+          <p:cNvPr id="2" name="Title 1">
+            <a:extLst>
+              <a:ext uri="{FF2B5EF4-FFF2-40B4-BE49-F238E27FC236}">
+                <a16:creationId xmlns:a16="http://schemas.microsoft.com/office/drawing/2014/main" id="{BC05F065-AE8C-A528-EDE0-693F95B149BE}"/>
+              </a:ext>
+            </a:extLst>
+          </p:cNvPr>
           <p:cNvSpPr>
             <a:spLocks noGrp="1"/>
           </p:cNvSpPr>
@@ -5632,52 +8366,235 @@
               <a:buNone/>
             </a:pPr>
             <a:r>
-              <a:t>Key Findings</a:t>
-            </a:r>
-          </a:p>
-        </p:txBody>
-      </p:sp>
-      <p:sp>
-        <p:nvSpPr>
-          <p:cNvPr id="3" name="Content Placeholder 2"/>
-          <p:cNvSpPr>
-            <a:spLocks noGrp="1"/>
-          </p:cNvSpPr>
-          <p:nvPr>
-            <p:ph idx="1"/>
-          </p:nvPr>
-        </p:nvSpPr>
-        <p:spPr/>
-        <p:txBody>
-          <a:bodyPr/>
-          <a:lstStyle/>
-          <a:p>
-            <a:pPr lvl="0"/>
-            <a:r>
-              <a:t>Systematic assessment of AI assistants</a:t>
-            </a:r>
-          </a:p>
-          <a:p>
-            <a:pPr lvl="0"/>
-            <a:r>
-              <a:t>Identification of strengths/weaknesses</a:t>
-            </a:r>
-          </a:p>
-          <a:p>
-            <a:pPr lvl="0"/>
-            <a:r>
-              <a:t>Comparative analysis capabilities</a:t>
-            </a:r>
-          </a:p>
-          <a:p>
-            <a:pPr lvl="0"/>
-            <a:r>
-              <a:t>Areas for improvement in AI writing tools</a:t>
-            </a:r>
-          </a:p>
-        </p:txBody>
-      </p:sp>
+              <a:rPr lang="en-US" dirty="0"/>
+              <a:t>What about simple benchmarks like writing assistance?</a:t>
+            </a:r>
+            <a:endParaRPr dirty="0"/>
+          </a:p>
+        </p:txBody>
+      </p:sp>
+      <p:pic>
+        <p:nvPicPr>
+          <p:cNvPr id="4" name="Picture 3">
+            <a:extLst>
+              <a:ext uri="{FF2B5EF4-FFF2-40B4-BE49-F238E27FC236}">
+                <a16:creationId xmlns:a16="http://schemas.microsoft.com/office/drawing/2014/main" id="{2EBC9060-5593-7550-628F-E965710B8BA3}"/>
+              </a:ext>
+            </a:extLst>
+          </p:cNvPr>
+          <p:cNvPicPr>
+            <a:picLocks noChangeAspect="1"/>
+          </p:cNvPicPr>
+          <p:nvPr/>
+        </p:nvPicPr>
+        <p:blipFill>
+          <a:blip r:embed="rId2"/>
+          <a:stretch>
+            <a:fillRect/>
+          </a:stretch>
+        </p:blipFill>
+        <p:spPr>
+          <a:xfrm>
+            <a:off x="6219987" y="1445924"/>
+            <a:ext cx="2059161" cy="2320776"/>
+          </a:xfrm>
+          <a:prstGeom prst="rect">
+            <a:avLst/>
+          </a:prstGeom>
+        </p:spPr>
+      </p:pic>
+      <p:pic>
+        <p:nvPicPr>
+          <p:cNvPr id="5" name="Picture 4">
+            <a:extLst>
+              <a:ext uri="{FF2B5EF4-FFF2-40B4-BE49-F238E27FC236}">
+                <a16:creationId xmlns:a16="http://schemas.microsoft.com/office/drawing/2014/main" id="{D612710C-57C3-A39A-B065-F6551D346DBF}"/>
+              </a:ext>
+            </a:extLst>
+          </p:cNvPr>
+          <p:cNvPicPr>
+            <a:picLocks noChangeAspect="1"/>
+          </p:cNvPicPr>
+          <p:nvPr/>
+        </p:nvPicPr>
+        <p:blipFill>
+          <a:blip r:embed="rId3"/>
+          <a:stretch>
+            <a:fillRect/>
+          </a:stretch>
+        </p:blipFill>
+        <p:spPr>
+          <a:xfrm>
+            <a:off x="6755909" y="3872404"/>
+            <a:ext cx="987316" cy="987316"/>
+          </a:xfrm>
+          <a:prstGeom prst="rect">
+            <a:avLst/>
+          </a:prstGeom>
+        </p:spPr>
+      </p:pic>
+      <p:pic>
+        <p:nvPicPr>
+          <p:cNvPr id="6" name="Graphic 5">
+            <a:extLst>
+              <a:ext uri="{FF2B5EF4-FFF2-40B4-BE49-F238E27FC236}">
+                <a16:creationId xmlns:a16="http://schemas.microsoft.com/office/drawing/2014/main" id="{4A05E3F3-1FC9-A3C2-1FC7-DBBCA30407E1}"/>
+              </a:ext>
+            </a:extLst>
+          </p:cNvPr>
+          <p:cNvPicPr>
+            <a:picLocks noChangeAspect="1"/>
+          </p:cNvPicPr>
+          <p:nvPr/>
+        </p:nvPicPr>
+        <p:blipFill>
+          <a:blip r:embed="rId4">
+            <a:extLst>
+              <a:ext uri="{96DAC541-7B7A-43D3-8B79-37D633B846F1}">
+                <asvg:svgBlip xmlns:asvg="http://schemas.microsoft.com/office/drawing/2016/SVG/main" r:embed="rId5"/>
+              </a:ext>
+            </a:extLst>
+          </a:blip>
+          <a:stretch>
+            <a:fillRect/>
+          </a:stretch>
+        </p:blipFill>
+        <p:spPr>
+          <a:xfrm>
+            <a:off x="6447778" y="1058218"/>
+            <a:ext cx="1603578" cy="334854"/>
+          </a:xfrm>
+          <a:prstGeom prst="rect">
+            <a:avLst/>
+          </a:prstGeom>
+        </p:spPr>
+      </p:pic>
+      <p:pic>
+        <p:nvPicPr>
+          <p:cNvPr id="12" name="Picture 11">
+            <a:extLst>
+              <a:ext uri="{FF2B5EF4-FFF2-40B4-BE49-F238E27FC236}">
+                <a16:creationId xmlns:a16="http://schemas.microsoft.com/office/drawing/2014/main" id="{F7657D95-8585-FE07-25FE-AAD4FB5B3578}"/>
+              </a:ext>
+            </a:extLst>
+          </p:cNvPr>
+          <p:cNvPicPr>
+            <a:picLocks noChangeAspect="1"/>
+          </p:cNvPicPr>
+          <p:nvPr/>
+        </p:nvPicPr>
+        <p:blipFill>
+          <a:blip r:embed="rId6"/>
+          <a:stretch>
+            <a:fillRect/>
+          </a:stretch>
+        </p:blipFill>
+        <p:spPr>
+          <a:xfrm>
+            <a:off x="380280" y="1580173"/>
+            <a:ext cx="3377693" cy="603997"/>
+          </a:xfrm>
+          <a:prstGeom prst="rect">
+            <a:avLst/>
+          </a:prstGeom>
+        </p:spPr>
+      </p:pic>
+      <p:pic>
+        <p:nvPicPr>
+          <p:cNvPr id="13" name="Picture 12">
+            <a:extLst>
+              <a:ext uri="{FF2B5EF4-FFF2-40B4-BE49-F238E27FC236}">
+                <a16:creationId xmlns:a16="http://schemas.microsoft.com/office/drawing/2014/main" id="{A1E4944A-0063-FC53-57FD-9D24BEE46933}"/>
+              </a:ext>
+            </a:extLst>
+          </p:cNvPr>
+          <p:cNvPicPr>
+            <a:picLocks noChangeAspect="1"/>
+          </p:cNvPicPr>
+          <p:nvPr/>
+        </p:nvPicPr>
+        <p:blipFill>
+          <a:blip r:embed="rId7"/>
+          <a:stretch>
+            <a:fillRect/>
+          </a:stretch>
+        </p:blipFill>
+        <p:spPr>
+          <a:xfrm>
+            <a:off x="373555" y="2304556"/>
+            <a:ext cx="752683" cy="752683"/>
+          </a:xfrm>
+          <a:prstGeom prst="rect">
+            <a:avLst/>
+          </a:prstGeom>
+        </p:spPr>
+      </p:pic>
+      <p:pic>
+        <p:nvPicPr>
+          <p:cNvPr id="14" name="Picture 13">
+            <a:extLst>
+              <a:ext uri="{FF2B5EF4-FFF2-40B4-BE49-F238E27FC236}">
+                <a16:creationId xmlns:a16="http://schemas.microsoft.com/office/drawing/2014/main" id="{F30E62DE-499B-AF29-A12D-4F410216A466}"/>
+              </a:ext>
+            </a:extLst>
+          </p:cNvPr>
+          <p:cNvPicPr>
+            <a:picLocks noChangeAspect="1"/>
+          </p:cNvPicPr>
+          <p:nvPr/>
+        </p:nvPicPr>
+        <p:blipFill>
+          <a:blip r:embed="rId8"/>
+          <a:stretch>
+            <a:fillRect/>
+          </a:stretch>
+        </p:blipFill>
+        <p:spPr>
+          <a:xfrm>
+            <a:off x="373555" y="1058218"/>
+            <a:ext cx="3384417" cy="426315"/>
+          </a:xfrm>
+          <a:prstGeom prst="rect">
+            <a:avLst/>
+          </a:prstGeom>
+        </p:spPr>
+      </p:pic>
+      <p:pic>
+        <p:nvPicPr>
+          <p:cNvPr id="15" name="Picture 14">
+            <a:extLst>
+              <a:ext uri="{FF2B5EF4-FFF2-40B4-BE49-F238E27FC236}">
+                <a16:creationId xmlns:a16="http://schemas.microsoft.com/office/drawing/2014/main" id="{642FE2BE-0275-25AA-54F6-2556F502C9C3}"/>
+              </a:ext>
+            </a:extLst>
+          </p:cNvPr>
+          <p:cNvPicPr>
+            <a:picLocks noChangeAspect="1"/>
+          </p:cNvPicPr>
+          <p:nvPr/>
+        </p:nvPicPr>
+        <p:blipFill>
+          <a:blip r:embed="rId9"/>
+          <a:stretch>
+            <a:fillRect/>
+          </a:stretch>
+        </p:blipFill>
+        <p:spPr>
+          <a:xfrm>
+            <a:off x="2698793" y="2255586"/>
+            <a:ext cx="1059179" cy="801653"/>
+          </a:xfrm>
+          <a:prstGeom prst="rect">
+            <a:avLst/>
+          </a:prstGeom>
+        </p:spPr>
+      </p:pic>
     </p:spTree>
+    <p:extLst>
+      <p:ext uri="{BB962C8B-B14F-4D97-AF65-F5344CB8AC3E}">
+        <p14:creationId xmlns:p14="http://schemas.microsoft.com/office/powerpoint/2010/main" val="2366781714"/>
+      </p:ext>
+    </p:extLst>
   </p:cSld>
   <p:clrMapOvr>
     <a:masterClrMapping/>

</xml_diff>